<commit_message>
animações basicas prontas... tentativa de build 0.001 - bug, falha na build quando toca animação de pulo e queda.
</commit_message>
<xml_diff>
--- a/Project Data/Ciclo de trabalho.pptx
+++ b/Project Data/Ciclo de trabalho.pptx
@@ -3479,7 +3479,7 @@
           <a:p>
             <a:fld id="{033C220F-AFE8-4CCC-95E1-E0424241E150}" type="datetimeFigureOut">
               <a:rPr lang="pt-BR" smtClean="0"/>
-              <a:t>01/11/2017</a:t>
+              <a:t>06/11/2017</a:t>
             </a:fld>
             <a:endParaRPr lang="pt-BR"/>
           </a:p>
@@ -3649,7 +3649,7 @@
           <a:p>
             <a:fld id="{033C220F-AFE8-4CCC-95E1-E0424241E150}" type="datetimeFigureOut">
               <a:rPr lang="pt-BR" smtClean="0"/>
-              <a:t>01/11/2017</a:t>
+              <a:t>06/11/2017</a:t>
             </a:fld>
             <a:endParaRPr lang="pt-BR"/>
           </a:p>
@@ -3829,7 +3829,7 @@
           <a:p>
             <a:fld id="{033C220F-AFE8-4CCC-95E1-E0424241E150}" type="datetimeFigureOut">
               <a:rPr lang="pt-BR" smtClean="0"/>
-              <a:t>01/11/2017</a:t>
+              <a:t>06/11/2017</a:t>
             </a:fld>
             <a:endParaRPr lang="pt-BR"/>
           </a:p>
@@ -3999,7 +3999,7 @@
           <a:p>
             <a:fld id="{033C220F-AFE8-4CCC-95E1-E0424241E150}" type="datetimeFigureOut">
               <a:rPr lang="pt-BR" smtClean="0"/>
-              <a:t>01/11/2017</a:t>
+              <a:t>06/11/2017</a:t>
             </a:fld>
             <a:endParaRPr lang="pt-BR"/>
           </a:p>
@@ -4245,7 +4245,7 @@
           <a:p>
             <a:fld id="{033C220F-AFE8-4CCC-95E1-E0424241E150}" type="datetimeFigureOut">
               <a:rPr lang="pt-BR" smtClean="0"/>
-              <a:t>01/11/2017</a:t>
+              <a:t>06/11/2017</a:t>
             </a:fld>
             <a:endParaRPr lang="pt-BR"/>
           </a:p>
@@ -4477,7 +4477,7 @@
           <a:p>
             <a:fld id="{033C220F-AFE8-4CCC-95E1-E0424241E150}" type="datetimeFigureOut">
               <a:rPr lang="pt-BR" smtClean="0"/>
-              <a:t>01/11/2017</a:t>
+              <a:t>06/11/2017</a:t>
             </a:fld>
             <a:endParaRPr lang="pt-BR"/>
           </a:p>
@@ -4844,7 +4844,7 @@
           <a:p>
             <a:fld id="{033C220F-AFE8-4CCC-95E1-E0424241E150}" type="datetimeFigureOut">
               <a:rPr lang="pt-BR" smtClean="0"/>
-              <a:t>01/11/2017</a:t>
+              <a:t>06/11/2017</a:t>
             </a:fld>
             <a:endParaRPr lang="pt-BR"/>
           </a:p>
@@ -4962,7 +4962,7 @@
           <a:p>
             <a:fld id="{033C220F-AFE8-4CCC-95E1-E0424241E150}" type="datetimeFigureOut">
               <a:rPr lang="pt-BR" smtClean="0"/>
-              <a:t>01/11/2017</a:t>
+              <a:t>06/11/2017</a:t>
             </a:fld>
             <a:endParaRPr lang="pt-BR"/>
           </a:p>
@@ -5057,7 +5057,7 @@
           <a:p>
             <a:fld id="{033C220F-AFE8-4CCC-95E1-E0424241E150}" type="datetimeFigureOut">
               <a:rPr lang="pt-BR" smtClean="0"/>
-              <a:t>01/11/2017</a:t>
+              <a:t>06/11/2017</a:t>
             </a:fld>
             <a:endParaRPr lang="pt-BR"/>
           </a:p>
@@ -5334,7 +5334,7 @@
           <a:p>
             <a:fld id="{033C220F-AFE8-4CCC-95E1-E0424241E150}" type="datetimeFigureOut">
               <a:rPr lang="pt-BR" smtClean="0"/>
-              <a:t>01/11/2017</a:t>
+              <a:t>06/11/2017</a:t>
             </a:fld>
             <a:endParaRPr lang="pt-BR"/>
           </a:p>
@@ -5587,7 +5587,7 @@
           <a:p>
             <a:fld id="{033C220F-AFE8-4CCC-95E1-E0424241E150}" type="datetimeFigureOut">
               <a:rPr lang="pt-BR" smtClean="0"/>
-              <a:t>01/11/2017</a:t>
+              <a:t>06/11/2017</a:t>
             </a:fld>
             <a:endParaRPr lang="pt-BR"/>
           </a:p>
@@ -5800,7 +5800,7 @@
           <a:p>
             <a:fld id="{033C220F-AFE8-4CCC-95E1-E0424241E150}" type="datetimeFigureOut">
               <a:rPr lang="pt-BR" smtClean="0"/>
-              <a:t>01/11/2017</a:t>
+              <a:t>06/11/2017</a:t>
             </a:fld>
             <a:endParaRPr lang="pt-BR"/>
           </a:p>
@@ -6682,8 +6682,8 @@
         </p:nvSpPr>
         <p:spPr>
           <a:xfrm>
-            <a:off x="5533180" y="2084426"/>
-            <a:ext cx="6337242" cy="3139321"/>
+            <a:off x="5467277" y="980554"/>
+            <a:ext cx="6337242" cy="3416320"/>
           </a:xfrm>
           <a:prstGeom prst="rect">
             <a:avLst/>
@@ -6729,7 +6729,198 @@
           <a:p>
             <a:r>
               <a:rPr lang="pt-BR" dirty="0" smtClean="0"/>
-              <a:t>	- Remodelar </a:t>
+              <a:t>	- </a:t>
+            </a:r>
+            <a:r>
+              <a:rPr lang="pt-BR" strike="sngStrike" dirty="0" smtClean="0"/>
+              <a:t>Remodelar </a:t>
+            </a:r>
+            <a:r>
+              <a:rPr lang="pt-BR" strike="sngStrike" dirty="0" err="1" smtClean="0"/>
+              <a:t>level</a:t>
+            </a:r>
+            <a:r>
+              <a:rPr lang="pt-BR" strike="sngStrike" dirty="0" smtClean="0"/>
+              <a:t> 1 com tiles simples ou copiados</a:t>
+            </a:r>
+          </a:p>
+          <a:p>
+            <a:r>
+              <a:rPr lang="pt-BR" dirty="0"/>
+              <a:t>	</a:t>
+            </a:r>
+            <a:r>
+              <a:rPr lang="pt-BR" dirty="0" smtClean="0"/>
+              <a:t>- Desenhar animações de pulo, corrida e </a:t>
+            </a:r>
+            <a:r>
+              <a:rPr lang="pt-BR" dirty="0" err="1" smtClean="0"/>
+              <a:t>iddle</a:t>
+            </a:r>
+            <a:endParaRPr lang="pt-BR" dirty="0" smtClean="0"/>
+          </a:p>
+          <a:p>
+            <a:r>
+              <a:rPr lang="pt-BR" dirty="0"/>
+              <a:t>	</a:t>
+            </a:r>
+            <a:r>
+              <a:rPr lang="pt-BR" strike="sngStrike" dirty="0" smtClean="0"/>
+              <a:t>- habilidades de correr mais rápido</a:t>
+            </a:r>
+          </a:p>
+          <a:p>
+            <a:r>
+              <a:rPr lang="pt-BR" dirty="0"/>
+              <a:t>	</a:t>
+            </a:r>
+            <a:r>
+              <a:rPr lang="pt-BR" dirty="0" smtClean="0"/>
+              <a:t>- programar o </a:t>
+            </a:r>
+            <a:r>
+              <a:rPr lang="pt-BR" dirty="0" err="1" smtClean="0"/>
+              <a:t>wall</a:t>
+            </a:r>
+            <a:r>
+              <a:rPr lang="pt-BR" dirty="0" smtClean="0"/>
+              <a:t> </a:t>
+            </a:r>
+            <a:r>
+              <a:rPr lang="pt-BR" dirty="0" err="1" smtClean="0"/>
+              <a:t>jump</a:t>
+            </a:r>
+            <a:r>
+              <a:rPr lang="pt-BR" dirty="0" smtClean="0"/>
+              <a:t> para ser coletável, isso servirá para outras habilidades</a:t>
+            </a:r>
+            <a:r>
+              <a:rPr lang="pt-BR" dirty="0" smtClean="0"/>
+              <a:t>.</a:t>
+            </a:r>
+          </a:p>
+          <a:p>
+            <a:r>
+              <a:rPr lang="pt-BR" dirty="0" smtClean="0"/>
+              <a:t>	- tornar o raio amigável ao </a:t>
+            </a:r>
+            <a:r>
+              <a:rPr lang="pt-BR" dirty="0" err="1" smtClean="0"/>
+              <a:t>tileset</a:t>
+            </a:r>
+            <a:r>
+              <a:rPr lang="pt-BR" dirty="0" smtClean="0"/>
+              <a:t> 32x32</a:t>
+            </a:r>
+            <a:endParaRPr lang="pt-BR" dirty="0" smtClean="0"/>
+          </a:p>
+          <a:p>
+            <a:r>
+              <a:rPr lang="pt-BR" dirty="0"/>
+              <a:t>	</a:t>
+            </a:r>
+            <a:r>
+              <a:rPr lang="pt-BR" dirty="0" smtClean="0"/>
+              <a:t>- animação </a:t>
+            </a:r>
+            <a:r>
+              <a:rPr lang="pt-BR" dirty="0" err="1" smtClean="0"/>
+              <a:t>mik</a:t>
+            </a:r>
+            <a:endParaRPr lang="pt-BR" dirty="0" smtClean="0"/>
+          </a:p>
+          <a:p>
+            <a:r>
+              <a:rPr lang="pt-BR" dirty="0"/>
+              <a:t>	</a:t>
+            </a:r>
+            <a:r>
+              <a:rPr lang="pt-BR" dirty="0" smtClean="0"/>
+              <a:t>- Fazer ser visível qual o botão selecionado mesmo com o </a:t>
+            </a:r>
+            <a:r>
+              <a:rPr lang="pt-BR" dirty="0" err="1" smtClean="0"/>
+              <a:t>gamepad</a:t>
+            </a:r>
+            <a:r>
+              <a:rPr lang="pt-BR" dirty="0" smtClean="0"/>
+              <a:t> (mouse já é de boa com a função </a:t>
+            </a:r>
+            <a:r>
+              <a:rPr lang="pt-BR" dirty="0" err="1" smtClean="0"/>
+              <a:t>hover</a:t>
+            </a:r>
+            <a:r>
+              <a:rPr lang="pt-BR" dirty="0" smtClean="0"/>
+              <a:t>). Adicionar contorno as vidas para que seja possível indicar quantas vidas se tem</a:t>
+            </a:r>
+          </a:p>
+        </p:txBody>
+      </p:sp>
+      <p:sp>
+        <p:nvSpPr>
+          <p:cNvPr id="10" name="CaixaDeTexto 9"/>
+          <p:cNvSpPr txBox="1"/>
+          <p:nvPr/>
+        </p:nvSpPr>
+        <p:spPr>
+          <a:xfrm>
+            <a:off x="5467277" y="4337472"/>
+            <a:ext cx="6337242" cy="2585323"/>
+          </a:xfrm>
+          <a:prstGeom prst="rect">
+            <a:avLst/>
+          </a:prstGeom>
+          <a:noFill/>
+        </p:spPr>
+        <p:txBody>
+          <a:bodyPr wrap="square" rtlCol="0">
+            <a:spAutoFit/>
+          </a:bodyPr>
+          <a:lstStyle/>
+          <a:p>
+            <a:r>
+              <a:rPr lang="pt-BR" dirty="0" smtClean="0"/>
+              <a:t>Sexto </a:t>
+            </a:r>
+            <a:r>
+              <a:rPr lang="pt-BR" dirty="0" smtClean="0"/>
+              <a:t>ciclo</a:t>
+            </a:r>
+            <a:r>
+              <a:rPr lang="pt-BR" dirty="0" smtClean="0">
+                <a:sym typeface="Wingdings" panose="05000000000000000000" pitchFamily="2" charset="2"/>
+              </a:rPr>
+              <a:t>: </a:t>
+            </a:r>
+            <a:r>
+              <a:rPr lang="pt-BR" dirty="0" smtClean="0">
+                <a:sym typeface="Wingdings" panose="05000000000000000000" pitchFamily="2" charset="2"/>
+              </a:rPr>
+              <a:t>(</a:t>
+            </a:r>
+            <a:r>
+              <a:rPr lang="pt-BR" dirty="0" err="1" smtClean="0">
+                <a:sym typeface="Wingdings" panose="05000000000000000000" pitchFamily="2" charset="2"/>
+              </a:rPr>
+              <a:t>QuickRefactor</a:t>
+            </a:r>
+            <a:r>
+              <a:rPr lang="pt-BR" dirty="0" smtClean="0">
+                <a:sym typeface="Wingdings" panose="05000000000000000000" pitchFamily="2" charset="2"/>
+              </a:rPr>
+              <a:t>)</a:t>
+            </a:r>
+            <a:endParaRPr lang="pt-BR" dirty="0" smtClean="0"/>
+          </a:p>
+          <a:p>
+            <a:r>
+              <a:rPr lang="pt-BR" dirty="0" smtClean="0"/>
+              <a:t>	- </a:t>
+            </a:r>
+            <a:r>
+              <a:rPr lang="pt-BR" dirty="0" smtClean="0"/>
+              <a:t>Concluir </a:t>
             </a:r>
             <a:r>
               <a:rPr lang="pt-BR" dirty="0" err="1" smtClean="0"/>
@@ -6737,8 +6928,21 @@
             </a:r>
             <a:r>
               <a:rPr lang="pt-BR" dirty="0" smtClean="0"/>
-              <a:t> 1 com tiles simples ou copiados</a:t>
-            </a:r>
+              <a:t> 1 e carregar informações para </a:t>
+            </a:r>
+            <a:r>
+              <a:rPr lang="pt-BR" dirty="0" err="1" smtClean="0"/>
+              <a:t>proximo</a:t>
+            </a:r>
+            <a:r>
+              <a:rPr lang="pt-BR" dirty="0" smtClean="0"/>
+              <a:t> </a:t>
+            </a:r>
+            <a:r>
+              <a:rPr lang="pt-BR" dirty="0" err="1" smtClean="0"/>
+              <a:t>level</a:t>
+            </a:r>
+            <a:endParaRPr lang="pt-BR" dirty="0" smtClean="0"/>
           </a:p>
           <a:p>
             <a:r>
@@ -6747,11 +6951,15 @@
             </a:r>
             <a:r>
               <a:rPr lang="pt-BR" dirty="0" smtClean="0"/>
-              <a:t>- Desenhar animações de pulo, corrida e </a:t>
+              <a:t>- Desenhar animações </a:t>
+            </a:r>
+            <a:r>
+              <a:rPr lang="pt-BR" dirty="0" smtClean="0"/>
+              <a:t>slide, hit, </a:t>
             </a:r>
             <a:r>
               <a:rPr lang="pt-BR" dirty="0" err="1" smtClean="0"/>
-              <a:t>iddle</a:t>
+              <a:t>death</a:t>
             </a:r>
             <a:endParaRPr lang="pt-BR" dirty="0" smtClean="0"/>
           </a:p>
@@ -6762,8 +6970,13 @@
             </a:r>
             <a:r>
               <a:rPr lang="pt-BR" dirty="0" smtClean="0"/>
-              <a:t>- habilidades de correr mais rápido</a:t>
-            </a:r>
+              <a:t>- </a:t>
+            </a:r>
+            <a:r>
+              <a:rPr lang="pt-BR" dirty="0" smtClean="0"/>
+              <a:t>Controles (não sei)</a:t>
+            </a:r>
+            <a:endParaRPr lang="pt-BR" dirty="0" smtClean="0"/>
           </a:p>
           <a:p>
             <a:r>
@@ -6772,24 +6985,21 @@
             </a:r>
             <a:r>
               <a:rPr lang="pt-BR" dirty="0" smtClean="0"/>
-              <a:t>- programar o </a:t>
+              <a:t>- </a:t>
+            </a:r>
+            <a:r>
+              <a:rPr lang="pt-BR" dirty="0" smtClean="0"/>
+              <a:t>desenhar animação de </a:t>
             </a:r>
             <a:r>
               <a:rPr lang="pt-BR" dirty="0" err="1" smtClean="0"/>
-              <a:t>wall</a:t>
+              <a:t>dazzling</a:t>
             </a:r>
             <a:r>
               <a:rPr lang="pt-BR" dirty="0" smtClean="0"/>
-              <a:t> </a:t>
-            </a:r>
-            <a:r>
-              <a:rPr lang="pt-BR" dirty="0" err="1" smtClean="0"/>
-              <a:t>jump</a:t>
-            </a:r>
-            <a:r>
-              <a:rPr lang="pt-BR" dirty="0" smtClean="0"/>
-              <a:t> para ser coletável, isso servirá para outras habilidades.</a:t>
-            </a:r>
+              <a:t> ao coletar coisas importantes</a:t>
+            </a:r>
+            <a:endParaRPr lang="pt-BR" dirty="0" smtClean="0"/>
           </a:p>
           <a:p>
             <a:r>
@@ -6798,11 +7008,7 @@
             </a:r>
             <a:r>
               <a:rPr lang="pt-BR" dirty="0" smtClean="0"/>
-              <a:t>- animação </a:t>
-            </a:r>
-            <a:r>
-              <a:rPr lang="pt-BR" dirty="0" err="1" smtClean="0"/>
-              <a:t>mik</a:t>
+              <a:t>- plataformas que caem com espetos embaixo</a:t>
             </a:r>
             <a:endParaRPr lang="pt-BR" dirty="0" smtClean="0"/>
           </a:p>
@@ -6813,24 +7019,9 @@
             </a:r>
             <a:r>
               <a:rPr lang="pt-BR" dirty="0" smtClean="0"/>
-              <a:t>- Fazer ser visível qual o botão selecionado mesmo com o </a:t>
-            </a:r>
-            <a:r>
-              <a:rPr lang="pt-BR" dirty="0" err="1" smtClean="0"/>
-              <a:t>gamepad</a:t>
-            </a:r>
-            <a:r>
-              <a:rPr lang="pt-BR" dirty="0" smtClean="0"/>
-              <a:t> (mouse já é de boa com a função </a:t>
-            </a:r>
-            <a:r>
-              <a:rPr lang="pt-BR" dirty="0" err="1" smtClean="0"/>
-              <a:t>hover</a:t>
-            </a:r>
-            <a:r>
-              <a:rPr lang="pt-BR" dirty="0" smtClean="0"/>
-              <a:t>). Adicionar contorno as vidas para que seja possível indicar quantas vidas se tem</a:t>
-            </a:r>
+              <a:t>- desenhar tela para inicio de jogo</a:t>
+            </a:r>
+            <a:endParaRPr lang="pt-BR" dirty="0" smtClean="0"/>
           </a:p>
         </p:txBody>
       </p:sp>
@@ -6844,6 +7035,13 @@
   <p:clrMapOvr>
     <a:masterClrMapping/>
   </p:clrMapOvr>
+  <p:timing>
+    <p:tnLst>
+      <p:par>
+        <p:cTn id="1" dur="indefinite" restart="never" nodeType="tmRoot"/>
+      </p:par>
+    </p:tnLst>
+  </p:timing>
 </p:sld>
 </file>
 
@@ -8904,6 +9102,13 @@
   <p:clrMapOvr>
     <a:masterClrMapping/>
   </p:clrMapOvr>
+  <p:timing>
+    <p:tnLst>
+      <p:par>
+        <p:cTn id="1" dur="indefinite" restart="never" nodeType="tmRoot"/>
+      </p:par>
+    </p:tnLst>
+  </p:timing>
 </p:sld>
 </file>
 

</xml_diff>

<commit_message>
bomba causa dano no mik
</commit_message>
<xml_diff>
--- a/Project Data/Ciclo de trabalho.pptx
+++ b/Project Data/Ciclo de trabalho.pptx
@@ -3479,7 +3479,7 @@
           <a:p>
             <a:fld id="{033C220F-AFE8-4CCC-95E1-E0424241E150}" type="datetimeFigureOut">
               <a:rPr lang="pt-BR" smtClean="0"/>
-              <a:t>06/11/2017</a:t>
+              <a:t>14/11/2017</a:t>
             </a:fld>
             <a:endParaRPr lang="pt-BR"/>
           </a:p>
@@ -3649,7 +3649,7 @@
           <a:p>
             <a:fld id="{033C220F-AFE8-4CCC-95E1-E0424241E150}" type="datetimeFigureOut">
               <a:rPr lang="pt-BR" smtClean="0"/>
-              <a:t>06/11/2017</a:t>
+              <a:t>14/11/2017</a:t>
             </a:fld>
             <a:endParaRPr lang="pt-BR"/>
           </a:p>
@@ -3829,7 +3829,7 @@
           <a:p>
             <a:fld id="{033C220F-AFE8-4CCC-95E1-E0424241E150}" type="datetimeFigureOut">
               <a:rPr lang="pt-BR" smtClean="0"/>
-              <a:t>06/11/2017</a:t>
+              <a:t>14/11/2017</a:t>
             </a:fld>
             <a:endParaRPr lang="pt-BR"/>
           </a:p>
@@ -3999,7 +3999,7 @@
           <a:p>
             <a:fld id="{033C220F-AFE8-4CCC-95E1-E0424241E150}" type="datetimeFigureOut">
               <a:rPr lang="pt-BR" smtClean="0"/>
-              <a:t>06/11/2017</a:t>
+              <a:t>14/11/2017</a:t>
             </a:fld>
             <a:endParaRPr lang="pt-BR"/>
           </a:p>
@@ -4245,7 +4245,7 @@
           <a:p>
             <a:fld id="{033C220F-AFE8-4CCC-95E1-E0424241E150}" type="datetimeFigureOut">
               <a:rPr lang="pt-BR" smtClean="0"/>
-              <a:t>06/11/2017</a:t>
+              <a:t>14/11/2017</a:t>
             </a:fld>
             <a:endParaRPr lang="pt-BR"/>
           </a:p>
@@ -4477,7 +4477,7 @@
           <a:p>
             <a:fld id="{033C220F-AFE8-4CCC-95E1-E0424241E150}" type="datetimeFigureOut">
               <a:rPr lang="pt-BR" smtClean="0"/>
-              <a:t>06/11/2017</a:t>
+              <a:t>14/11/2017</a:t>
             </a:fld>
             <a:endParaRPr lang="pt-BR"/>
           </a:p>
@@ -4844,7 +4844,7 @@
           <a:p>
             <a:fld id="{033C220F-AFE8-4CCC-95E1-E0424241E150}" type="datetimeFigureOut">
               <a:rPr lang="pt-BR" smtClean="0"/>
-              <a:t>06/11/2017</a:t>
+              <a:t>14/11/2017</a:t>
             </a:fld>
             <a:endParaRPr lang="pt-BR"/>
           </a:p>
@@ -4962,7 +4962,7 @@
           <a:p>
             <a:fld id="{033C220F-AFE8-4CCC-95E1-E0424241E150}" type="datetimeFigureOut">
               <a:rPr lang="pt-BR" smtClean="0"/>
-              <a:t>06/11/2017</a:t>
+              <a:t>14/11/2017</a:t>
             </a:fld>
             <a:endParaRPr lang="pt-BR"/>
           </a:p>
@@ -5057,7 +5057,7 @@
           <a:p>
             <a:fld id="{033C220F-AFE8-4CCC-95E1-E0424241E150}" type="datetimeFigureOut">
               <a:rPr lang="pt-BR" smtClean="0"/>
-              <a:t>06/11/2017</a:t>
+              <a:t>14/11/2017</a:t>
             </a:fld>
             <a:endParaRPr lang="pt-BR"/>
           </a:p>
@@ -5334,7 +5334,7 @@
           <a:p>
             <a:fld id="{033C220F-AFE8-4CCC-95E1-E0424241E150}" type="datetimeFigureOut">
               <a:rPr lang="pt-BR" smtClean="0"/>
-              <a:t>06/11/2017</a:t>
+              <a:t>14/11/2017</a:t>
             </a:fld>
             <a:endParaRPr lang="pt-BR"/>
           </a:p>
@@ -5587,7 +5587,7 @@
           <a:p>
             <a:fld id="{033C220F-AFE8-4CCC-95E1-E0424241E150}" type="datetimeFigureOut">
               <a:rPr lang="pt-BR" smtClean="0"/>
-              <a:t>06/11/2017</a:t>
+              <a:t>14/11/2017</a:t>
             </a:fld>
             <a:endParaRPr lang="pt-BR"/>
           </a:p>
@@ -5800,7 +5800,7 @@
           <a:p>
             <a:fld id="{033C220F-AFE8-4CCC-95E1-E0424241E150}" type="datetimeFigureOut">
               <a:rPr lang="pt-BR" smtClean="0"/>
-              <a:t>06/11/2017</a:t>
+              <a:t>14/11/2017</a:t>
             </a:fld>
             <a:endParaRPr lang="pt-BR"/>
           </a:p>
@@ -6683,7 +6683,7 @@
         <p:spPr>
           <a:xfrm>
             <a:off x="5467277" y="980554"/>
-            <a:ext cx="6337242" cy="3416320"/>
+            <a:ext cx="6337242" cy="3139321"/>
           </a:xfrm>
           <a:prstGeom prst="rect">
             <a:avLst/>
@@ -6776,27 +6776,19 @@
             </a:r>
             <a:r>
               <a:rPr lang="pt-BR" dirty="0" smtClean="0"/>
-              <a:t>- programar o </a:t>
-            </a:r>
-            <a:r>
-              <a:rPr lang="pt-BR" dirty="0" err="1" smtClean="0"/>
-              <a:t>wall</a:t>
+              <a:t>- programar </a:t>
             </a:r>
             <a:r>
               <a:rPr lang="pt-BR" dirty="0" smtClean="0"/>
-              <a:t> </a:t>
-            </a:r>
-            <a:r>
-              <a:rPr lang="pt-BR" dirty="0" err="1" smtClean="0"/>
-              <a:t>jump</a:t>
+              <a:t>joga bombas para </a:t>
             </a:r>
             <a:r>
               <a:rPr lang="pt-BR" dirty="0" smtClean="0"/>
-              <a:t> para ser coletável, isso servirá para outras habilidades</a:t>
+              <a:t>ser </a:t>
             </a:r>
             <a:r>
               <a:rPr lang="pt-BR" dirty="0" smtClean="0"/>
-              <a:t>.</a:t>
+              <a:t>coletável</a:t>
             </a:r>
           </a:p>
           <a:p>
@@ -6812,7 +6804,6 @@
               <a:rPr lang="pt-BR" dirty="0" smtClean="0"/>
               <a:t> 32x32</a:t>
             </a:r>
-            <a:endParaRPr lang="pt-BR" dirty="0" smtClean="0"/>
           </a:p>
           <a:p>
             <a:r>
@@ -6881,23 +6872,13 @@
           <a:p>
             <a:r>
               <a:rPr lang="pt-BR" dirty="0" smtClean="0"/>
-              <a:t>Sexto </a:t>
-            </a:r>
-            <a:r>
-              <a:rPr lang="pt-BR" dirty="0" smtClean="0"/>
-              <a:t>ciclo</a:t>
+              <a:t>Sexto ciclo</a:t>
             </a:r>
             <a:r>
               <a:rPr lang="pt-BR" dirty="0" smtClean="0">
                 <a:sym typeface="Wingdings" panose="05000000000000000000" pitchFamily="2" charset="2"/>
               </a:rPr>
-              <a:t>: </a:t>
-            </a:r>
-            <a:r>
-              <a:rPr lang="pt-BR" dirty="0" smtClean="0">
-                <a:sym typeface="Wingdings" panose="05000000000000000000" pitchFamily="2" charset="2"/>
-              </a:rPr>
-              <a:t>(</a:t>
+              <a:t>: (</a:t>
             </a:r>
             <a:r>
               <a:rPr lang="pt-BR" dirty="0" err="1" smtClean="0">
@@ -6916,11 +6897,7 @@
           <a:p>
             <a:r>
               <a:rPr lang="pt-BR" dirty="0" smtClean="0"/>
-              <a:t>	- </a:t>
-            </a:r>
-            <a:r>
-              <a:rPr lang="pt-BR" dirty="0" smtClean="0"/>
-              <a:t>Concluir </a:t>
+              <a:t>	- Concluir </a:t>
             </a:r>
             <a:r>
               <a:rPr lang="pt-BR" dirty="0" err="1" smtClean="0"/>
@@ -6951,11 +6928,7 @@
             </a:r>
             <a:r>
               <a:rPr lang="pt-BR" dirty="0" smtClean="0"/>
-              <a:t>- Desenhar animações </a:t>
-            </a:r>
-            <a:r>
-              <a:rPr lang="pt-BR" dirty="0" smtClean="0"/>
-              <a:t>slide, hit, </a:t>
+              <a:t>- Desenhar animações slide, hit, </a:t>
             </a:r>
             <a:r>
               <a:rPr lang="pt-BR" dirty="0" err="1" smtClean="0"/>
@@ -6970,13 +6943,8 @@
             </a:r>
             <a:r>
               <a:rPr lang="pt-BR" dirty="0" smtClean="0"/>
-              <a:t>- </a:t>
-            </a:r>
-            <a:r>
-              <a:rPr lang="pt-BR" dirty="0" smtClean="0"/>
-              <a:t>Controles (não sei)</a:t>
-            </a:r>
-            <a:endParaRPr lang="pt-BR" dirty="0" smtClean="0"/>
+              <a:t>- Controles (não sei)</a:t>
+            </a:r>
           </a:p>
           <a:p>
             <a:r>
@@ -6985,11 +6953,7 @@
             </a:r>
             <a:r>
               <a:rPr lang="pt-BR" dirty="0" smtClean="0"/>
-              <a:t>- </a:t>
-            </a:r>
-            <a:r>
-              <a:rPr lang="pt-BR" dirty="0" smtClean="0"/>
-              <a:t>desenhar animação de </a:t>
+              <a:t>- desenhar animação de </a:t>
             </a:r>
             <a:r>
               <a:rPr lang="pt-BR" dirty="0" err="1" smtClean="0"/>
@@ -6999,7 +6963,6 @@
               <a:rPr lang="pt-BR" dirty="0" smtClean="0"/>
               <a:t> ao coletar coisas importantes</a:t>
             </a:r>
-            <a:endParaRPr lang="pt-BR" dirty="0" smtClean="0"/>
           </a:p>
           <a:p>
             <a:r>
@@ -7010,7 +6973,6 @@
               <a:rPr lang="pt-BR" dirty="0" smtClean="0"/>
               <a:t>- plataformas que caem com espetos embaixo</a:t>
             </a:r>
-            <a:endParaRPr lang="pt-BR" dirty="0" smtClean="0"/>
           </a:p>
           <a:p>
             <a:r>
@@ -7021,7 +6983,6 @@
               <a:rPr lang="pt-BR" dirty="0" smtClean="0"/>
               <a:t>- desenhar tela para inicio de jogo</a:t>
             </a:r>
-            <a:endParaRPr lang="pt-BR" dirty="0" smtClean="0"/>
           </a:p>
         </p:txBody>
       </p:sp>

</xml_diff>

<commit_message>
fim do quinto ciclo
</commit_message>
<xml_diff>
--- a/Project Data/Ciclo de trabalho.pptx
+++ b/Project Data/Ciclo de trabalho.pptx
@@ -1138,7 +1138,7 @@
       </dgm:t>
     </dgm:pt>
     <dgm:pt modelId="{F352CCD2-62DF-4A79-86CF-16258AD5F186}" type="pres">
-      <dgm:prSet presAssocID="{1F56803A-CBCA-4B80-9ED8-161886EDBA08}" presName="sibTransFirstNode" presStyleLbl="bgShp" presStyleIdx="0" presStyleCnt="1"/>
+      <dgm:prSet presAssocID="{1F56803A-CBCA-4B80-9ED8-161886EDBA08}" presName="sibTransFirstNode" presStyleLbl="bgShp" presStyleIdx="0" presStyleCnt="1" custLinFactNeighborX="5208" custLinFactNeighborY="905"/>
       <dgm:spPr/>
       <dgm:t>
         <a:bodyPr/>
@@ -1273,7 +1273,7 @@
       </dsp:nvSpPr>
       <dsp:spPr>
         <a:xfrm>
-          <a:off x="150258" y="138936"/>
+          <a:off x="415047" y="184949"/>
           <a:ext cx="5084279" cy="5084279"/>
         </a:xfrm>
         <a:prstGeom prst="circularArrow">
@@ -3369,7 +3369,7 @@
           <a:p>
             <a:fld id="{033C220F-AFE8-4CCC-95E1-E0424241E150}" type="datetimeFigureOut">
               <a:rPr lang="pt-BR" smtClean="0"/>
-              <a:t>22/11/2017</a:t>
+              <a:t>28/11/2017</a:t>
             </a:fld>
             <a:endParaRPr lang="pt-BR"/>
           </a:p>
@@ -3539,7 +3539,7 @@
           <a:p>
             <a:fld id="{033C220F-AFE8-4CCC-95E1-E0424241E150}" type="datetimeFigureOut">
               <a:rPr lang="pt-BR" smtClean="0"/>
-              <a:t>22/11/2017</a:t>
+              <a:t>28/11/2017</a:t>
             </a:fld>
             <a:endParaRPr lang="pt-BR"/>
           </a:p>
@@ -3719,7 +3719,7 @@
           <a:p>
             <a:fld id="{033C220F-AFE8-4CCC-95E1-E0424241E150}" type="datetimeFigureOut">
               <a:rPr lang="pt-BR" smtClean="0"/>
-              <a:t>22/11/2017</a:t>
+              <a:t>28/11/2017</a:t>
             </a:fld>
             <a:endParaRPr lang="pt-BR"/>
           </a:p>
@@ -3889,7 +3889,7 @@
           <a:p>
             <a:fld id="{033C220F-AFE8-4CCC-95E1-E0424241E150}" type="datetimeFigureOut">
               <a:rPr lang="pt-BR" smtClean="0"/>
-              <a:t>22/11/2017</a:t>
+              <a:t>28/11/2017</a:t>
             </a:fld>
             <a:endParaRPr lang="pt-BR"/>
           </a:p>
@@ -4135,7 +4135,7 @@
           <a:p>
             <a:fld id="{033C220F-AFE8-4CCC-95E1-E0424241E150}" type="datetimeFigureOut">
               <a:rPr lang="pt-BR" smtClean="0"/>
-              <a:t>22/11/2017</a:t>
+              <a:t>28/11/2017</a:t>
             </a:fld>
             <a:endParaRPr lang="pt-BR"/>
           </a:p>
@@ -4367,7 +4367,7 @@
           <a:p>
             <a:fld id="{033C220F-AFE8-4CCC-95E1-E0424241E150}" type="datetimeFigureOut">
               <a:rPr lang="pt-BR" smtClean="0"/>
-              <a:t>22/11/2017</a:t>
+              <a:t>28/11/2017</a:t>
             </a:fld>
             <a:endParaRPr lang="pt-BR"/>
           </a:p>
@@ -4734,7 +4734,7 @@
           <a:p>
             <a:fld id="{033C220F-AFE8-4CCC-95E1-E0424241E150}" type="datetimeFigureOut">
               <a:rPr lang="pt-BR" smtClean="0"/>
-              <a:t>22/11/2017</a:t>
+              <a:t>28/11/2017</a:t>
             </a:fld>
             <a:endParaRPr lang="pt-BR"/>
           </a:p>
@@ -4852,7 +4852,7 @@
           <a:p>
             <a:fld id="{033C220F-AFE8-4CCC-95E1-E0424241E150}" type="datetimeFigureOut">
               <a:rPr lang="pt-BR" smtClean="0"/>
-              <a:t>22/11/2017</a:t>
+              <a:t>28/11/2017</a:t>
             </a:fld>
             <a:endParaRPr lang="pt-BR"/>
           </a:p>
@@ -4947,7 +4947,7 @@
           <a:p>
             <a:fld id="{033C220F-AFE8-4CCC-95E1-E0424241E150}" type="datetimeFigureOut">
               <a:rPr lang="pt-BR" smtClean="0"/>
-              <a:t>22/11/2017</a:t>
+              <a:t>28/11/2017</a:t>
             </a:fld>
             <a:endParaRPr lang="pt-BR"/>
           </a:p>
@@ -5224,7 +5224,7 @@
           <a:p>
             <a:fld id="{033C220F-AFE8-4CCC-95E1-E0424241E150}" type="datetimeFigureOut">
               <a:rPr lang="pt-BR" smtClean="0"/>
-              <a:t>22/11/2017</a:t>
+              <a:t>28/11/2017</a:t>
             </a:fld>
             <a:endParaRPr lang="pt-BR"/>
           </a:p>
@@ -5477,7 +5477,7 @@
           <a:p>
             <a:fld id="{033C220F-AFE8-4CCC-95E1-E0424241E150}" type="datetimeFigureOut">
               <a:rPr lang="pt-BR" smtClean="0"/>
-              <a:t>22/11/2017</a:t>
+              <a:t>28/11/2017</a:t>
             </a:fld>
             <a:endParaRPr lang="pt-BR"/>
           </a:p>
@@ -5690,7 +5690,7 @@
           <a:p>
             <a:fld id="{033C220F-AFE8-4CCC-95E1-E0424241E150}" type="datetimeFigureOut">
               <a:rPr lang="pt-BR" smtClean="0"/>
-              <a:t>22/11/2017</a:t>
+              <a:t>28/11/2017</a:t>
             </a:fld>
             <a:endParaRPr lang="pt-BR"/>
           </a:p>
@@ -6102,13 +6102,13 @@
           <p:nvPr>
             <p:extLst>
               <p:ext uri="{D42A27DB-BD31-4B8C-83A1-F6EECF244321}">
-                <p14:modId xmlns:p14="http://schemas.microsoft.com/office/powerpoint/2010/main" val="1862705273"/>
+                <p14:modId xmlns:p14="http://schemas.microsoft.com/office/powerpoint/2010/main" val="1461853631"/>
               </p:ext>
             </p:extLst>
           </p:nvPr>
         </p:nvGraphicFramePr>
         <p:xfrm>
-          <a:off x="-517194" y="0"/>
+          <a:off x="40701" y="75080"/>
           <a:ext cx="5449922" cy="5327009"/>
         </p:xfrm>
         <a:graphic>
@@ -6572,8 +6572,8 @@
         </p:nvSpPr>
         <p:spPr>
           <a:xfrm>
-            <a:off x="5467277" y="980554"/>
-            <a:ext cx="6337242" cy="3139321"/>
+            <a:off x="9964918" y="923"/>
+            <a:ext cx="2125363" cy="1169551"/>
           </a:xfrm>
           <a:prstGeom prst="rect">
             <a:avLst/>
@@ -6587,145 +6587,145 @@
           <a:lstStyle/>
           <a:p>
             <a:r>
-              <a:rPr lang="pt-BR" dirty="0" smtClean="0"/>
+              <a:rPr lang="pt-BR" sz="700" dirty="0" smtClean="0"/>
               <a:t>Quinto ciclo</a:t>
             </a:r>
             <a:r>
-              <a:rPr lang="pt-BR" dirty="0" smtClean="0">
+              <a:rPr lang="pt-BR" sz="700" dirty="0" smtClean="0">
                 <a:sym typeface="Wingdings" panose="05000000000000000000" pitchFamily="2" charset="2"/>
               </a:rPr>
               <a:t>: </a:t>
             </a:r>
             <a:r>
-              <a:rPr lang="pt-BR" strike="sngStrike" dirty="0" smtClean="0">
+              <a:rPr lang="pt-BR" sz="700" strike="sngStrike" dirty="0" smtClean="0">
                 <a:sym typeface="Wingdings" panose="05000000000000000000" pitchFamily="2" charset="2"/>
               </a:rPr>
               <a:t>(BIG </a:t>
             </a:r>
             <a:r>
-              <a:rPr lang="pt-BR" strike="sngStrike" dirty="0" err="1" smtClean="0">
+              <a:rPr lang="pt-BR" sz="700" strike="sngStrike" dirty="0" err="1" smtClean="0">
                 <a:sym typeface="Wingdings" panose="05000000000000000000" pitchFamily="2" charset="2"/>
               </a:rPr>
               <a:t>Refactor</a:t>
             </a:r>
             <a:r>
-              <a:rPr lang="pt-BR" strike="sngStrike" dirty="0" smtClean="0">
+              <a:rPr lang="pt-BR" sz="700" strike="sngStrike" dirty="0" smtClean="0">
                 <a:sym typeface="Wingdings" panose="05000000000000000000" pitchFamily="2" charset="2"/>
               </a:rPr>
               <a:t>)</a:t>
             </a:r>
-            <a:endParaRPr lang="pt-BR" strike="sngStrike" dirty="0" smtClean="0"/>
-          </a:p>
-          <a:p>
-            <a:r>
-              <a:rPr lang="pt-BR" dirty="0" smtClean="0"/>
-              <a:t>	- </a:t>
-            </a:r>
-            <a:r>
-              <a:rPr lang="pt-BR" strike="sngStrike" dirty="0" smtClean="0"/>
+            <a:endParaRPr lang="pt-BR" sz="700" strike="sngStrike" dirty="0" smtClean="0"/>
+          </a:p>
+          <a:p>
+            <a:r>
+              <a:rPr lang="pt-BR" sz="700" dirty="0" smtClean="0"/>
+              <a:t>- </a:t>
+            </a:r>
+            <a:r>
+              <a:rPr lang="pt-BR" sz="700" strike="sngStrike" dirty="0" smtClean="0"/>
               <a:t>Remodelar </a:t>
             </a:r>
             <a:r>
-              <a:rPr lang="pt-BR" strike="sngStrike" dirty="0" err="1" smtClean="0"/>
+              <a:rPr lang="pt-BR" sz="700" strike="sngStrike" dirty="0" err="1" smtClean="0"/>
               <a:t>level</a:t>
             </a:r>
             <a:r>
-              <a:rPr lang="pt-BR" strike="sngStrike" dirty="0" smtClean="0"/>
+              <a:rPr lang="pt-BR" sz="700" strike="sngStrike" dirty="0" smtClean="0"/>
               <a:t> 1 com tiles simples ou copiados</a:t>
             </a:r>
           </a:p>
           <a:p>
             <a:r>
-              <a:rPr lang="pt-BR" dirty="0"/>
-              <a:t>	</a:t>
-            </a:r>
-            <a:r>
-              <a:rPr lang="pt-BR" strike="sngStrike" dirty="0" smtClean="0"/>
-              <a:t>- Desenhar animações de pulo, corrida e </a:t>
-            </a:r>
-            <a:r>
-              <a:rPr lang="pt-BR" strike="sngStrike" dirty="0" err="1" smtClean="0"/>
+              <a:rPr lang="pt-BR" sz="700" strike="sngStrike" dirty="0" smtClean="0"/>
+              <a:t>- </a:t>
+            </a:r>
+            <a:r>
+              <a:rPr lang="pt-BR" sz="700" strike="sngStrike" dirty="0" smtClean="0"/>
+              <a:t>Desenhar animações de pulo, corrida e </a:t>
+            </a:r>
+            <a:r>
+              <a:rPr lang="pt-BR" sz="700" strike="sngStrike" dirty="0" err="1" smtClean="0"/>
               <a:t>iddle</a:t>
             </a:r>
-            <a:endParaRPr lang="pt-BR" strike="sngStrike" dirty="0" smtClean="0"/>
-          </a:p>
-          <a:p>
-            <a:r>
-              <a:rPr lang="pt-BR" dirty="0"/>
-              <a:t>	</a:t>
-            </a:r>
-            <a:r>
-              <a:rPr lang="pt-BR" strike="sngStrike" dirty="0" smtClean="0"/>
-              <a:t>- habilidades de correr mais rápido</a:t>
-            </a:r>
-          </a:p>
-          <a:p>
-            <a:r>
-              <a:rPr lang="pt-BR" dirty="0"/>
-              <a:t>	</a:t>
-            </a:r>
-            <a:r>
-              <a:rPr lang="pt-BR" strike="sngStrike" dirty="0" smtClean="0"/>
-              <a:t>- programar joga bombas para ser coletável</a:t>
-            </a:r>
-          </a:p>
-          <a:p>
-            <a:r>
-              <a:rPr lang="pt-BR" dirty="0" smtClean="0"/>
-              <a:t>	</a:t>
-            </a:r>
-            <a:r>
-              <a:rPr lang="pt-BR" strike="sngStrike" dirty="0" smtClean="0"/>
-              <a:t>- tornar o raio amigável ao </a:t>
-            </a:r>
-            <a:r>
-              <a:rPr lang="pt-BR" strike="sngStrike" dirty="0" err="1" smtClean="0"/>
+            <a:endParaRPr lang="pt-BR" sz="700" strike="sngStrike" dirty="0" smtClean="0"/>
+          </a:p>
+          <a:p>
+            <a:r>
+              <a:rPr lang="pt-BR" sz="700" strike="sngStrike" dirty="0" smtClean="0"/>
+              <a:t>- </a:t>
+            </a:r>
+            <a:r>
+              <a:rPr lang="pt-BR" sz="700" strike="sngStrike" dirty="0" smtClean="0"/>
+              <a:t>habilidades de correr mais rápido</a:t>
+            </a:r>
+          </a:p>
+          <a:p>
+            <a:r>
+              <a:rPr lang="pt-BR" sz="700" strike="sngStrike" dirty="0" smtClean="0"/>
+              <a:t>- </a:t>
+            </a:r>
+            <a:r>
+              <a:rPr lang="pt-BR" sz="700" strike="sngStrike" dirty="0" smtClean="0"/>
+              <a:t>programar joga bombas para ser coletável</a:t>
+            </a:r>
+          </a:p>
+          <a:p>
+            <a:r>
+              <a:rPr lang="pt-BR" sz="700" strike="sngStrike" dirty="0" smtClean="0"/>
+              <a:t>- </a:t>
+            </a:r>
+            <a:r>
+              <a:rPr lang="pt-BR" sz="700" strike="sngStrike" dirty="0" smtClean="0"/>
+              <a:t>tornar o raio amigável ao </a:t>
+            </a:r>
+            <a:r>
+              <a:rPr lang="pt-BR" sz="700" strike="sngStrike" dirty="0" err="1" smtClean="0"/>
               <a:t>tileset</a:t>
             </a:r>
             <a:r>
-              <a:rPr lang="pt-BR" strike="sngStrike" dirty="0" smtClean="0"/>
+              <a:rPr lang="pt-BR" sz="700" strike="sngStrike" dirty="0" smtClean="0"/>
               <a:t> 32x32</a:t>
             </a:r>
           </a:p>
           <a:p>
             <a:r>
-              <a:rPr lang="pt-BR" dirty="0"/>
-              <a:t>	</a:t>
-            </a:r>
-            <a:r>
-              <a:rPr lang="pt-BR" dirty="0" smtClean="0"/>
-              <a:t>- animação </a:t>
-            </a:r>
-            <a:r>
-              <a:rPr lang="pt-BR" dirty="0" err="1" smtClean="0"/>
+              <a:rPr lang="pt-BR" sz="700" strike="sngStrike" dirty="0" smtClean="0"/>
+              <a:t>- </a:t>
+            </a:r>
+            <a:r>
+              <a:rPr lang="pt-BR" sz="700" strike="sngStrike" dirty="0" smtClean="0"/>
+              <a:t>animação </a:t>
+            </a:r>
+            <a:r>
+              <a:rPr lang="pt-BR" sz="700" strike="sngStrike" dirty="0" err="1" smtClean="0"/>
               <a:t>mik</a:t>
             </a:r>
-            <a:endParaRPr lang="pt-BR" dirty="0" smtClean="0"/>
-          </a:p>
-          <a:p>
-            <a:r>
-              <a:rPr lang="pt-BR" dirty="0"/>
-              <a:t>	</a:t>
-            </a:r>
-            <a:r>
-              <a:rPr lang="pt-BR" dirty="0" smtClean="0"/>
-              <a:t>- Fazer ser visível qual o botão selecionado mesmo com o </a:t>
-            </a:r>
-            <a:r>
-              <a:rPr lang="pt-BR" dirty="0" err="1" smtClean="0"/>
+            <a:endParaRPr lang="pt-BR" sz="700" strike="sngStrike" dirty="0" smtClean="0"/>
+          </a:p>
+          <a:p>
+            <a:r>
+              <a:rPr lang="pt-BR" sz="700" strike="sngStrike" dirty="0" smtClean="0"/>
+              <a:t>- </a:t>
+            </a:r>
+            <a:r>
+              <a:rPr lang="pt-BR" sz="700" strike="sngStrike" dirty="0" smtClean="0"/>
+              <a:t>Fazer ser visível qual o botão selecionado mesmo com o </a:t>
+            </a:r>
+            <a:r>
+              <a:rPr lang="pt-BR" sz="700" strike="sngStrike" dirty="0" err="1" smtClean="0"/>
               <a:t>gamepad</a:t>
             </a:r>
             <a:r>
-              <a:rPr lang="pt-BR" dirty="0" smtClean="0"/>
+              <a:rPr lang="pt-BR" sz="700" strike="sngStrike" dirty="0" smtClean="0"/>
               <a:t> (mouse já é de boa com a função </a:t>
             </a:r>
             <a:r>
-              <a:rPr lang="pt-BR" dirty="0" err="1" smtClean="0"/>
+              <a:rPr lang="pt-BR" sz="700" strike="sngStrike" dirty="0" err="1" smtClean="0"/>
               <a:t>hover</a:t>
             </a:r>
             <a:r>
-              <a:rPr lang="pt-BR" dirty="0" smtClean="0"/>
-              <a:t>). Adicionar contorno as vidas para que seja possível indicar quantas vidas se tem</a:t>
+              <a:rPr lang="pt-BR" sz="700" strike="sngStrike" dirty="0" smtClean="0"/>
+              <a:t>). UI : vidas , espigas e bombas funcionando</a:t>
             </a:r>
           </a:p>
         </p:txBody>
@@ -6738,7 +6738,7 @@
         </p:nvSpPr>
         <p:spPr>
           <a:xfrm>
-            <a:off x="5467277" y="4337472"/>
+            <a:off x="5664985" y="1170474"/>
             <a:ext cx="6337242" cy="2585323"/>
           </a:xfrm>
           <a:prstGeom prst="rect">

</xml_diff>

<commit_message>
mik collinsion upgrade - do once and collision detection changed to X comparizon
</commit_message>
<xml_diff>
--- a/Project Data/Ciclo de trabalho.pptx
+++ b/Project Data/Ciclo de trabalho.pptx
@@ -3369,7 +3369,7 @@
           <a:p>
             <a:fld id="{033C220F-AFE8-4CCC-95E1-E0424241E150}" type="datetimeFigureOut">
               <a:rPr lang="pt-BR" smtClean="0"/>
-              <a:t>29/11/2017</a:t>
+              <a:t>03/12/2017</a:t>
             </a:fld>
             <a:endParaRPr lang="pt-BR"/>
           </a:p>
@@ -3539,7 +3539,7 @@
           <a:p>
             <a:fld id="{033C220F-AFE8-4CCC-95E1-E0424241E150}" type="datetimeFigureOut">
               <a:rPr lang="pt-BR" smtClean="0"/>
-              <a:t>29/11/2017</a:t>
+              <a:t>03/12/2017</a:t>
             </a:fld>
             <a:endParaRPr lang="pt-BR"/>
           </a:p>
@@ -3719,7 +3719,7 @@
           <a:p>
             <a:fld id="{033C220F-AFE8-4CCC-95E1-E0424241E150}" type="datetimeFigureOut">
               <a:rPr lang="pt-BR" smtClean="0"/>
-              <a:t>29/11/2017</a:t>
+              <a:t>03/12/2017</a:t>
             </a:fld>
             <a:endParaRPr lang="pt-BR"/>
           </a:p>
@@ -3889,7 +3889,7 @@
           <a:p>
             <a:fld id="{033C220F-AFE8-4CCC-95E1-E0424241E150}" type="datetimeFigureOut">
               <a:rPr lang="pt-BR" smtClean="0"/>
-              <a:t>29/11/2017</a:t>
+              <a:t>03/12/2017</a:t>
             </a:fld>
             <a:endParaRPr lang="pt-BR"/>
           </a:p>
@@ -4135,7 +4135,7 @@
           <a:p>
             <a:fld id="{033C220F-AFE8-4CCC-95E1-E0424241E150}" type="datetimeFigureOut">
               <a:rPr lang="pt-BR" smtClean="0"/>
-              <a:t>29/11/2017</a:t>
+              <a:t>03/12/2017</a:t>
             </a:fld>
             <a:endParaRPr lang="pt-BR"/>
           </a:p>
@@ -4367,7 +4367,7 @@
           <a:p>
             <a:fld id="{033C220F-AFE8-4CCC-95E1-E0424241E150}" type="datetimeFigureOut">
               <a:rPr lang="pt-BR" smtClean="0"/>
-              <a:t>29/11/2017</a:t>
+              <a:t>03/12/2017</a:t>
             </a:fld>
             <a:endParaRPr lang="pt-BR"/>
           </a:p>
@@ -4734,7 +4734,7 @@
           <a:p>
             <a:fld id="{033C220F-AFE8-4CCC-95E1-E0424241E150}" type="datetimeFigureOut">
               <a:rPr lang="pt-BR" smtClean="0"/>
-              <a:t>29/11/2017</a:t>
+              <a:t>03/12/2017</a:t>
             </a:fld>
             <a:endParaRPr lang="pt-BR"/>
           </a:p>
@@ -4852,7 +4852,7 @@
           <a:p>
             <a:fld id="{033C220F-AFE8-4CCC-95E1-E0424241E150}" type="datetimeFigureOut">
               <a:rPr lang="pt-BR" smtClean="0"/>
-              <a:t>29/11/2017</a:t>
+              <a:t>03/12/2017</a:t>
             </a:fld>
             <a:endParaRPr lang="pt-BR"/>
           </a:p>
@@ -4947,7 +4947,7 @@
           <a:p>
             <a:fld id="{033C220F-AFE8-4CCC-95E1-E0424241E150}" type="datetimeFigureOut">
               <a:rPr lang="pt-BR" smtClean="0"/>
-              <a:t>29/11/2017</a:t>
+              <a:t>03/12/2017</a:t>
             </a:fld>
             <a:endParaRPr lang="pt-BR"/>
           </a:p>
@@ -5224,7 +5224,7 @@
           <a:p>
             <a:fld id="{033C220F-AFE8-4CCC-95E1-E0424241E150}" type="datetimeFigureOut">
               <a:rPr lang="pt-BR" smtClean="0"/>
-              <a:t>29/11/2017</a:t>
+              <a:t>03/12/2017</a:t>
             </a:fld>
             <a:endParaRPr lang="pt-BR"/>
           </a:p>
@@ -5477,7 +5477,7 @@
           <a:p>
             <a:fld id="{033C220F-AFE8-4CCC-95E1-E0424241E150}" type="datetimeFigureOut">
               <a:rPr lang="pt-BR" smtClean="0"/>
-              <a:t>29/11/2017</a:t>
+              <a:t>03/12/2017</a:t>
             </a:fld>
             <a:endParaRPr lang="pt-BR"/>
           </a:p>
@@ -5690,7 +5690,7 @@
           <a:p>
             <a:fld id="{033C220F-AFE8-4CCC-95E1-E0424241E150}" type="datetimeFigureOut">
               <a:rPr lang="pt-BR" smtClean="0"/>
-              <a:t>29/11/2017</a:t>
+              <a:t>03/12/2017</a:t>
             </a:fld>
             <a:endParaRPr lang="pt-BR"/>
           </a:p>
@@ -6761,15 +6761,23 @@
           <a:p>
             <a:r>
               <a:rPr lang="pt-BR" dirty="0" smtClean="0"/>
-              <a:t>	- Concluir </a:t>
-            </a:r>
-            <a:r>
-              <a:rPr lang="pt-BR" dirty="0" err="1" smtClean="0"/>
+              <a:t>	- </a:t>
+            </a:r>
+            <a:r>
+              <a:rPr lang="pt-BR" strike="sngStrike" dirty="0" smtClean="0"/>
+              <a:t>Concluir </a:t>
+            </a:r>
+            <a:r>
+              <a:rPr lang="pt-BR" strike="sngStrike" dirty="0" err="1" smtClean="0"/>
               <a:t>level</a:t>
             </a:r>
             <a:r>
+              <a:rPr lang="pt-BR" strike="sngStrike" dirty="0" smtClean="0"/>
+              <a:t> 1 </a:t>
+            </a:r>
+            <a:r>
               <a:rPr lang="pt-BR" dirty="0" smtClean="0"/>
-              <a:t> 1 e carregar informações para próximo </a:t>
+              <a:t>e carregar informações para próximo </a:t>
             </a:r>
             <a:r>
               <a:rPr lang="pt-BR" dirty="0" err="1" smtClean="0"/>

</xml_diff>

<commit_message>
run and walk animation upgrade
</commit_message>
<xml_diff>
--- a/Project Data/Ciclo de trabalho.pptx
+++ b/Project Data/Ciclo de trabalho.pptx
@@ -1039,7 +1039,25 @@
             <a:rPr lang="pt-BR" dirty="0" smtClean="0"/>
             <a:t>Perigos</a:t>
           </a:r>
-          <a:endParaRPr lang="pt-BR" dirty="0"/>
+        </a:p>
+        <a:p>
+          <a:r>
+            <a:rPr lang="pt-BR" dirty="0" smtClean="0"/>
+            <a:t> </a:t>
+          </a:r>
+          <a:r>
+            <a:rPr lang="pt-BR" dirty="0" err="1" smtClean="0"/>
+            <a:t>stage</a:t>
+          </a:r>
+          <a:r>
+            <a:rPr lang="pt-BR" dirty="0" smtClean="0"/>
+            <a:t> </a:t>
+          </a:r>
+          <a:r>
+            <a:rPr lang="pt-BR" dirty="0" err="1" smtClean="0"/>
+            <a:t>assets</a:t>
+          </a:r>
+          <a:endParaRPr lang="pt-BR" dirty="0" smtClean="0"/>
         </a:p>
       </dgm:t>
     </dgm:pt>
@@ -1633,7 +1651,36 @@
             <a:rPr lang="pt-BR" sz="2000" kern="1200" dirty="0" smtClean="0"/>
             <a:t>Perigos</a:t>
           </a:r>
-          <a:endParaRPr lang="pt-BR" sz="2000" kern="1200" dirty="0"/>
+        </a:p>
+        <a:p>
+          <a:pPr lvl="0" algn="ctr" defTabSz="889000">
+            <a:lnSpc>
+              <a:spcPct val="90000"/>
+            </a:lnSpc>
+            <a:spcBef>
+              <a:spcPct val="0"/>
+            </a:spcBef>
+            <a:spcAft>
+              <a:spcPct val="35000"/>
+            </a:spcAft>
+          </a:pPr>
+          <a:r>
+            <a:rPr lang="pt-BR" sz="2000" kern="1200" dirty="0" smtClean="0"/>
+            <a:t> </a:t>
+          </a:r>
+          <a:r>
+            <a:rPr lang="pt-BR" sz="2000" kern="1200" dirty="0" err="1" smtClean="0"/>
+            <a:t>stage</a:t>
+          </a:r>
+          <a:r>
+            <a:rPr lang="pt-BR" sz="2000" kern="1200" dirty="0" smtClean="0"/>
+            <a:t> </a:t>
+          </a:r>
+          <a:r>
+            <a:rPr lang="pt-BR" sz="2000" kern="1200" dirty="0" err="1" smtClean="0"/>
+            <a:t>assets</a:t>
+          </a:r>
+          <a:endParaRPr lang="pt-BR" sz="2000" kern="1200" dirty="0" smtClean="0"/>
         </a:p>
       </dsp:txBody>
       <dsp:txXfrm>
@@ -3369,7 +3416,7 @@
           <a:p>
             <a:fld id="{033C220F-AFE8-4CCC-95E1-E0424241E150}" type="datetimeFigureOut">
               <a:rPr lang="pt-BR" smtClean="0"/>
-              <a:t>03/12/2017</a:t>
+              <a:t>20/12/2017</a:t>
             </a:fld>
             <a:endParaRPr lang="pt-BR"/>
           </a:p>
@@ -3539,7 +3586,7 @@
           <a:p>
             <a:fld id="{033C220F-AFE8-4CCC-95E1-E0424241E150}" type="datetimeFigureOut">
               <a:rPr lang="pt-BR" smtClean="0"/>
-              <a:t>03/12/2017</a:t>
+              <a:t>20/12/2017</a:t>
             </a:fld>
             <a:endParaRPr lang="pt-BR"/>
           </a:p>
@@ -3719,7 +3766,7 @@
           <a:p>
             <a:fld id="{033C220F-AFE8-4CCC-95E1-E0424241E150}" type="datetimeFigureOut">
               <a:rPr lang="pt-BR" smtClean="0"/>
-              <a:t>03/12/2017</a:t>
+              <a:t>20/12/2017</a:t>
             </a:fld>
             <a:endParaRPr lang="pt-BR"/>
           </a:p>
@@ -3889,7 +3936,7 @@
           <a:p>
             <a:fld id="{033C220F-AFE8-4CCC-95E1-E0424241E150}" type="datetimeFigureOut">
               <a:rPr lang="pt-BR" smtClean="0"/>
-              <a:t>03/12/2017</a:t>
+              <a:t>20/12/2017</a:t>
             </a:fld>
             <a:endParaRPr lang="pt-BR"/>
           </a:p>
@@ -4135,7 +4182,7 @@
           <a:p>
             <a:fld id="{033C220F-AFE8-4CCC-95E1-E0424241E150}" type="datetimeFigureOut">
               <a:rPr lang="pt-BR" smtClean="0"/>
-              <a:t>03/12/2017</a:t>
+              <a:t>20/12/2017</a:t>
             </a:fld>
             <a:endParaRPr lang="pt-BR"/>
           </a:p>
@@ -4367,7 +4414,7 @@
           <a:p>
             <a:fld id="{033C220F-AFE8-4CCC-95E1-E0424241E150}" type="datetimeFigureOut">
               <a:rPr lang="pt-BR" smtClean="0"/>
-              <a:t>03/12/2017</a:t>
+              <a:t>20/12/2017</a:t>
             </a:fld>
             <a:endParaRPr lang="pt-BR"/>
           </a:p>
@@ -4734,7 +4781,7 @@
           <a:p>
             <a:fld id="{033C220F-AFE8-4CCC-95E1-E0424241E150}" type="datetimeFigureOut">
               <a:rPr lang="pt-BR" smtClean="0"/>
-              <a:t>03/12/2017</a:t>
+              <a:t>20/12/2017</a:t>
             </a:fld>
             <a:endParaRPr lang="pt-BR"/>
           </a:p>
@@ -4852,7 +4899,7 @@
           <a:p>
             <a:fld id="{033C220F-AFE8-4CCC-95E1-E0424241E150}" type="datetimeFigureOut">
               <a:rPr lang="pt-BR" smtClean="0"/>
-              <a:t>03/12/2017</a:t>
+              <a:t>20/12/2017</a:t>
             </a:fld>
             <a:endParaRPr lang="pt-BR"/>
           </a:p>
@@ -4947,7 +4994,7 @@
           <a:p>
             <a:fld id="{033C220F-AFE8-4CCC-95E1-E0424241E150}" type="datetimeFigureOut">
               <a:rPr lang="pt-BR" smtClean="0"/>
-              <a:t>03/12/2017</a:t>
+              <a:t>20/12/2017</a:t>
             </a:fld>
             <a:endParaRPr lang="pt-BR"/>
           </a:p>
@@ -5224,7 +5271,7 @@
           <a:p>
             <a:fld id="{033C220F-AFE8-4CCC-95E1-E0424241E150}" type="datetimeFigureOut">
               <a:rPr lang="pt-BR" smtClean="0"/>
-              <a:t>03/12/2017</a:t>
+              <a:t>20/12/2017</a:t>
             </a:fld>
             <a:endParaRPr lang="pt-BR"/>
           </a:p>
@@ -5477,7 +5524,7 @@
           <a:p>
             <a:fld id="{033C220F-AFE8-4CCC-95E1-E0424241E150}" type="datetimeFigureOut">
               <a:rPr lang="pt-BR" smtClean="0"/>
-              <a:t>03/12/2017</a:t>
+              <a:t>20/12/2017</a:t>
             </a:fld>
             <a:endParaRPr lang="pt-BR"/>
           </a:p>
@@ -5690,7 +5737,7 @@
           <a:p>
             <a:fld id="{033C220F-AFE8-4CCC-95E1-E0424241E150}" type="datetimeFigureOut">
               <a:rPr lang="pt-BR" smtClean="0"/>
-              <a:t>03/12/2017</a:t>
+              <a:t>20/12/2017</a:t>
             </a:fld>
             <a:endParaRPr lang="pt-BR"/>
           </a:p>
@@ -6102,7 +6149,7 @@
           <p:nvPr>
             <p:extLst>
               <p:ext uri="{D42A27DB-BD31-4B8C-83A1-F6EECF244321}">
-                <p14:modId xmlns:p14="http://schemas.microsoft.com/office/powerpoint/2010/main" val="1461853631"/>
+                <p14:modId xmlns:p14="http://schemas.microsoft.com/office/powerpoint/2010/main" val="515299629"/>
               </p:ext>
             </p:extLst>
           </p:nvPr>
@@ -6715,7 +6762,7 @@
         <p:spPr>
           <a:xfrm>
             <a:off x="5664985" y="1170474"/>
-            <a:ext cx="6337242" cy="2585323"/>
+            <a:ext cx="6337242" cy="3416320"/>
           </a:xfrm>
           <a:prstGeom prst="rect">
             <a:avLst/>
@@ -6773,17 +6820,13 @@
             </a:r>
             <a:r>
               <a:rPr lang="pt-BR" strike="sngStrike" dirty="0" smtClean="0"/>
-              <a:t> 1 </a:t>
-            </a:r>
-            <a:r>
-              <a:rPr lang="pt-BR" dirty="0" smtClean="0"/>
-              <a:t>e carregar informações para próximo </a:t>
-            </a:r>
-            <a:r>
-              <a:rPr lang="pt-BR" dirty="0" err="1" smtClean="0"/>
+              <a:t> 1 e carregar informações para próximo </a:t>
+            </a:r>
+            <a:r>
+              <a:rPr lang="pt-BR" strike="sngStrike" dirty="0" err="1" smtClean="0"/>
               <a:t>level</a:t>
             </a:r>
-            <a:endParaRPr lang="pt-BR" dirty="0" smtClean="0"/>
+            <a:endParaRPr lang="pt-BR" strike="sngStrike" dirty="0" smtClean="0"/>
           </a:p>
           <a:p>
             <a:r>
@@ -6792,7 +6835,43 @@
             </a:r>
             <a:r>
               <a:rPr lang="pt-BR" dirty="0" smtClean="0"/>
-              <a:t>- Desenhar animações slide, hit, </a:t>
+              <a:t>- Desenhar animações </a:t>
+            </a:r>
+            <a:r>
+              <a:rPr lang="pt-BR" dirty="0" err="1" smtClean="0"/>
+              <a:t>add</a:t>
+            </a:r>
+            <a:r>
+              <a:rPr lang="pt-BR" dirty="0" smtClean="0"/>
+              <a:t> </a:t>
+            </a:r>
+            <a:r>
+              <a:rPr lang="pt-BR" dirty="0" err="1" smtClean="0"/>
+              <a:t>detail</a:t>
+            </a:r>
+            <a:r>
+              <a:rPr lang="pt-BR" dirty="0" smtClean="0"/>
+              <a:t> in </a:t>
+            </a:r>
+            <a:r>
+              <a:rPr lang="pt-BR" dirty="0" err="1" smtClean="0"/>
+              <a:t>existing</a:t>
+            </a:r>
+            <a:r>
+              <a:rPr lang="pt-BR" dirty="0" smtClean="0"/>
+              <a:t> </a:t>
+            </a:r>
+            <a:r>
+              <a:rPr lang="pt-BR" dirty="0" err="1" smtClean="0"/>
+              <a:t>ones</a:t>
+            </a:r>
+            <a:r>
+              <a:rPr lang="pt-BR" dirty="0" smtClean="0"/>
+              <a:t>, </a:t>
+            </a:r>
+            <a:r>
+              <a:rPr lang="pt-BR" dirty="0" smtClean="0"/>
+              <a:t>hit, </a:t>
             </a:r>
             <a:r>
               <a:rPr lang="pt-BR" dirty="0" err="1" smtClean="0"/>
@@ -6807,8 +6886,17 @@
             </a:r>
             <a:r>
               <a:rPr lang="pt-BR" dirty="0" smtClean="0"/>
-              <a:t>- Controles (não sei)</a:t>
-            </a:r>
+              <a:t>- Controles </a:t>
+            </a:r>
+            <a:r>
+              <a:rPr lang="pt-BR" dirty="0" smtClean="0"/>
+              <a:t>– programar um </a:t>
+            </a:r>
+            <a:r>
+              <a:rPr lang="pt-BR" dirty="0" err="1" smtClean="0"/>
+              <a:t>dash</a:t>
+            </a:r>
+            <a:endParaRPr lang="pt-BR" dirty="0" smtClean="0"/>
           </a:p>
           <a:p>
             <a:r>
@@ -6845,8 +6933,94 @@
             </a:r>
             <a:r>
               <a:rPr lang="pt-BR" dirty="0" smtClean="0"/>
-              <a:t>- desenhar tela para inicio de jogo</a:t>
-            </a:r>
+              <a:t>- desenhar tela para inicio de </a:t>
+            </a:r>
+            <a:r>
+              <a:rPr lang="pt-BR" dirty="0" smtClean="0"/>
+              <a:t>jogo</a:t>
+            </a:r>
+          </a:p>
+          <a:p>
+            <a:r>
+              <a:rPr lang="pt-BR" dirty="0"/>
+              <a:t>	</a:t>
+            </a:r>
+            <a:r>
+              <a:rPr lang="pt-BR" dirty="0" smtClean="0"/>
+              <a:t>- </a:t>
+            </a:r>
+            <a:r>
+              <a:rPr lang="pt-BR" dirty="0" err="1" smtClean="0"/>
+              <a:t>add</a:t>
+            </a:r>
+            <a:r>
+              <a:rPr lang="pt-BR" dirty="0" smtClean="0"/>
+              <a:t> menu </a:t>
+            </a:r>
+            <a:r>
+              <a:rPr lang="pt-BR" dirty="0" err="1" smtClean="0"/>
+              <a:t>with</a:t>
+            </a:r>
+            <a:r>
+              <a:rPr lang="pt-BR" dirty="0" smtClean="0"/>
+              <a:t> </a:t>
+            </a:r>
+            <a:r>
+              <a:rPr lang="pt-BR" dirty="0" err="1" smtClean="0"/>
+              <a:t>controls</a:t>
+            </a:r>
+            <a:endParaRPr lang="pt-BR" dirty="0" smtClean="0"/>
+          </a:p>
+          <a:p>
+            <a:r>
+              <a:rPr lang="pt-BR" dirty="0"/>
+              <a:t>	</a:t>
+            </a:r>
+            <a:r>
+              <a:rPr lang="pt-BR" dirty="0" smtClean="0"/>
+              <a:t>- </a:t>
+            </a:r>
+            <a:r>
+              <a:rPr lang="pt-BR" dirty="0" err="1" smtClean="0"/>
+              <a:t>add</a:t>
+            </a:r>
+            <a:r>
+              <a:rPr lang="pt-BR" dirty="0" smtClean="0"/>
+              <a:t> </a:t>
+            </a:r>
+            <a:r>
+              <a:rPr lang="pt-BR" dirty="0" err="1" smtClean="0"/>
+              <a:t>save</a:t>
+            </a:r>
+            <a:r>
+              <a:rPr lang="pt-BR" dirty="0" smtClean="0"/>
+              <a:t>/</a:t>
+            </a:r>
+            <a:r>
+              <a:rPr lang="pt-BR" dirty="0" err="1" smtClean="0"/>
+              <a:t>load</a:t>
+            </a:r>
+            <a:r>
+              <a:rPr lang="pt-BR" dirty="0" smtClean="0"/>
+              <a:t> </a:t>
+            </a:r>
+            <a:r>
+              <a:rPr lang="pt-BR" dirty="0" err="1" smtClean="0"/>
+              <a:t>logic</a:t>
+            </a:r>
+            <a:r>
+              <a:rPr lang="pt-BR" dirty="0" smtClean="0"/>
+              <a:t> </a:t>
+            </a:r>
+            <a:r>
+              <a:rPr lang="pt-BR" dirty="0" err="1" smtClean="0"/>
+              <a:t>to</a:t>
+            </a:r>
+            <a:r>
+              <a:rPr lang="pt-BR" dirty="0" smtClean="0"/>
+              <a:t> menus</a:t>
+            </a:r>
+            <a:endParaRPr lang="pt-BR" dirty="0" smtClean="0"/>
           </a:p>
         </p:txBody>
       </p:sp>

</xml_diff>

<commit_message>
dash logic upgrade( anim handler, jump integration) . Spkes logic upgrade (kepp doing damage if inside spike area)
</commit_message>
<xml_diff>
--- a/Project Data/Ciclo de trabalho.pptx
+++ b/Project Data/Ciclo de trabalho.pptx
@@ -3416,7 +3416,7 @@
           <a:p>
             <a:fld id="{033C220F-AFE8-4CCC-95E1-E0424241E150}" type="datetimeFigureOut">
               <a:rPr lang="pt-BR" smtClean="0"/>
-              <a:t>20/12/2017</a:t>
+              <a:t>15/01/2018</a:t>
             </a:fld>
             <a:endParaRPr lang="pt-BR"/>
           </a:p>
@@ -3586,7 +3586,7 @@
           <a:p>
             <a:fld id="{033C220F-AFE8-4CCC-95E1-E0424241E150}" type="datetimeFigureOut">
               <a:rPr lang="pt-BR" smtClean="0"/>
-              <a:t>20/12/2017</a:t>
+              <a:t>15/01/2018</a:t>
             </a:fld>
             <a:endParaRPr lang="pt-BR"/>
           </a:p>
@@ -3766,7 +3766,7 @@
           <a:p>
             <a:fld id="{033C220F-AFE8-4CCC-95E1-E0424241E150}" type="datetimeFigureOut">
               <a:rPr lang="pt-BR" smtClean="0"/>
-              <a:t>20/12/2017</a:t>
+              <a:t>15/01/2018</a:t>
             </a:fld>
             <a:endParaRPr lang="pt-BR"/>
           </a:p>
@@ -3936,7 +3936,7 @@
           <a:p>
             <a:fld id="{033C220F-AFE8-4CCC-95E1-E0424241E150}" type="datetimeFigureOut">
               <a:rPr lang="pt-BR" smtClean="0"/>
-              <a:t>20/12/2017</a:t>
+              <a:t>15/01/2018</a:t>
             </a:fld>
             <a:endParaRPr lang="pt-BR"/>
           </a:p>
@@ -4182,7 +4182,7 @@
           <a:p>
             <a:fld id="{033C220F-AFE8-4CCC-95E1-E0424241E150}" type="datetimeFigureOut">
               <a:rPr lang="pt-BR" smtClean="0"/>
-              <a:t>20/12/2017</a:t>
+              <a:t>15/01/2018</a:t>
             </a:fld>
             <a:endParaRPr lang="pt-BR"/>
           </a:p>
@@ -4414,7 +4414,7 @@
           <a:p>
             <a:fld id="{033C220F-AFE8-4CCC-95E1-E0424241E150}" type="datetimeFigureOut">
               <a:rPr lang="pt-BR" smtClean="0"/>
-              <a:t>20/12/2017</a:t>
+              <a:t>15/01/2018</a:t>
             </a:fld>
             <a:endParaRPr lang="pt-BR"/>
           </a:p>
@@ -4781,7 +4781,7 @@
           <a:p>
             <a:fld id="{033C220F-AFE8-4CCC-95E1-E0424241E150}" type="datetimeFigureOut">
               <a:rPr lang="pt-BR" smtClean="0"/>
-              <a:t>20/12/2017</a:t>
+              <a:t>15/01/2018</a:t>
             </a:fld>
             <a:endParaRPr lang="pt-BR"/>
           </a:p>
@@ -4899,7 +4899,7 @@
           <a:p>
             <a:fld id="{033C220F-AFE8-4CCC-95E1-E0424241E150}" type="datetimeFigureOut">
               <a:rPr lang="pt-BR" smtClean="0"/>
-              <a:t>20/12/2017</a:t>
+              <a:t>15/01/2018</a:t>
             </a:fld>
             <a:endParaRPr lang="pt-BR"/>
           </a:p>
@@ -4994,7 +4994,7 @@
           <a:p>
             <a:fld id="{033C220F-AFE8-4CCC-95E1-E0424241E150}" type="datetimeFigureOut">
               <a:rPr lang="pt-BR" smtClean="0"/>
-              <a:t>20/12/2017</a:t>
+              <a:t>15/01/2018</a:t>
             </a:fld>
             <a:endParaRPr lang="pt-BR"/>
           </a:p>
@@ -5271,7 +5271,7 @@
           <a:p>
             <a:fld id="{033C220F-AFE8-4CCC-95E1-E0424241E150}" type="datetimeFigureOut">
               <a:rPr lang="pt-BR" smtClean="0"/>
-              <a:t>20/12/2017</a:t>
+              <a:t>15/01/2018</a:t>
             </a:fld>
             <a:endParaRPr lang="pt-BR"/>
           </a:p>
@@ -5524,7 +5524,7 @@
           <a:p>
             <a:fld id="{033C220F-AFE8-4CCC-95E1-E0424241E150}" type="datetimeFigureOut">
               <a:rPr lang="pt-BR" smtClean="0"/>
-              <a:t>20/12/2017</a:t>
+              <a:t>15/01/2018</a:t>
             </a:fld>
             <a:endParaRPr lang="pt-BR"/>
           </a:p>
@@ -5737,7 +5737,7 @@
           <a:p>
             <a:fld id="{033C220F-AFE8-4CCC-95E1-E0424241E150}" type="datetimeFigureOut">
               <a:rPr lang="pt-BR" smtClean="0"/>
-              <a:t>20/12/2017</a:t>
+              <a:t>15/01/2018</a:t>
             </a:fld>
             <a:endParaRPr lang="pt-BR"/>
           </a:p>
@@ -6762,7 +6762,7 @@
         <p:spPr>
           <a:xfrm>
             <a:off x="5664985" y="1170474"/>
-            <a:ext cx="6337242" cy="3416320"/>
+            <a:ext cx="6337242" cy="2862322"/>
           </a:xfrm>
           <a:prstGeom prst="rect">
             <a:avLst/>
@@ -6907,11 +6907,7 @@
             </a:r>
             <a:r>
               <a:rPr lang="pt-BR" strike="sngStrike" dirty="0" smtClean="0"/>
-              <a:t>), </a:t>
-            </a:r>
-            <a:r>
-              <a:rPr lang="pt-BR" strike="sngStrike" dirty="0" smtClean="0"/>
-              <a:t>hit, </a:t>
+              <a:t>), hit, </a:t>
             </a:r>
             <a:r>
               <a:rPr lang="pt-BR" strike="sngStrike" dirty="0" err="1" smtClean="0"/>
@@ -6925,14 +6921,14 @@
               <a:t>	</a:t>
             </a:r>
             <a:r>
-              <a:rPr lang="pt-BR" dirty="0" smtClean="0"/>
+              <a:rPr lang="pt-BR" strike="sngStrike" dirty="0" smtClean="0"/>
               <a:t>- Controles – programar um </a:t>
             </a:r>
             <a:r>
-              <a:rPr lang="pt-BR" dirty="0" err="1" smtClean="0"/>
+              <a:rPr lang="pt-BR" strike="sngStrike" dirty="0" err="1" smtClean="0"/>
               <a:t>dash</a:t>
             </a:r>
-            <a:endParaRPr lang="pt-BR" dirty="0" smtClean="0"/>
+            <a:endParaRPr lang="pt-BR" strike="sngStrike" dirty="0" smtClean="0"/>
           </a:p>
           <a:p>
             <a:r>
@@ -6940,25 +6936,103 @@
               <a:t>	</a:t>
             </a:r>
             <a:r>
+              <a:rPr lang="pt-BR" strike="sngStrike" dirty="0" smtClean="0"/>
+              <a:t>- </a:t>
+            </a:r>
+            <a:r>
+              <a:rPr lang="pt-BR" strike="sngStrike" dirty="0" err="1" smtClean="0"/>
+              <a:t>spikes</a:t>
+            </a:r>
+            <a:r>
+              <a:rPr lang="pt-BR" strike="sngStrike" dirty="0" smtClean="0"/>
+              <a:t> </a:t>
+            </a:r>
+            <a:r>
+              <a:rPr lang="pt-BR" strike="sngStrike" dirty="0" err="1" smtClean="0"/>
+              <a:t>keeps</a:t>
+            </a:r>
+            <a:r>
+              <a:rPr lang="pt-BR" strike="sngStrike" dirty="0" smtClean="0"/>
+              <a:t> </a:t>
+            </a:r>
+            <a:r>
+              <a:rPr lang="pt-BR" strike="sngStrike" dirty="0" err="1" smtClean="0"/>
+              <a:t>damaging</a:t>
+            </a:r>
+            <a:r>
+              <a:rPr lang="pt-BR" strike="sngStrike" dirty="0" smtClean="0"/>
+              <a:t> </a:t>
+            </a:r>
+            <a:r>
+              <a:rPr lang="pt-BR" strike="sngStrike" dirty="0" err="1" smtClean="0"/>
+              <a:t>if</a:t>
+            </a:r>
+            <a:r>
+              <a:rPr lang="pt-BR" strike="sngStrike" dirty="0" smtClean="0"/>
+              <a:t> </a:t>
+            </a:r>
+            <a:r>
+              <a:rPr lang="pt-BR" strike="sngStrike" dirty="0" err="1" smtClean="0"/>
+              <a:t>inside</a:t>
+            </a:r>
+            <a:r>
+              <a:rPr lang="pt-BR" strike="sngStrike" dirty="0" smtClean="0"/>
+              <a:t> </a:t>
+            </a:r>
+            <a:r>
+              <a:rPr lang="pt-BR" strike="sngStrike" dirty="0" err="1" smtClean="0"/>
+              <a:t>colision</a:t>
+            </a:r>
+            <a:r>
+              <a:rPr lang="pt-BR" strike="sngStrike" dirty="0" smtClean="0"/>
+              <a:t> </a:t>
+            </a:r>
+            <a:r>
+              <a:rPr lang="pt-BR" strike="sngStrike" dirty="0" err="1" smtClean="0"/>
+              <a:t>area</a:t>
+            </a:r>
+            <a:endParaRPr lang="pt-BR" strike="sngStrike" dirty="0" smtClean="0"/>
+          </a:p>
+          <a:p>
+            <a:r>
+              <a:rPr lang="pt-BR" dirty="0"/>
+              <a:t>	</a:t>
+            </a:r>
+            <a:r>
+              <a:rPr lang="pt-BR" dirty="0" smtClean="0"/>
+              <a:t>- desenhar tela para inicio de jogo</a:t>
+            </a:r>
+          </a:p>
+          <a:p>
+            <a:r>
+              <a:rPr lang="pt-BR" dirty="0"/>
+              <a:t>	</a:t>
+            </a:r>
+            <a:r>
               <a:rPr lang="pt-BR" dirty="0" smtClean="0"/>
               <a:t>- </a:t>
             </a:r>
             <a:r>
+              <a:rPr lang="pt-BR" dirty="0" err="1" smtClean="0"/>
+              <a:t>add</a:t>
+            </a:r>
+            <a:r>
               <a:rPr lang="pt-BR" dirty="0" smtClean="0"/>
-              <a:t>desenhar </a:t>
+              <a:t> menu </a:t>
+            </a:r>
+            <a:r>
+              <a:rPr lang="pt-BR" dirty="0" err="1" smtClean="0"/>
+              <a:t>with</a:t>
             </a:r>
             <a:r>
               <a:rPr lang="pt-BR" dirty="0" smtClean="0"/>
-              <a:t>animação de </a:t>
+              <a:t> </a:t>
             </a:r>
             <a:r>
               <a:rPr lang="pt-BR" dirty="0" err="1" smtClean="0"/>
-              <a:t>dazzling</a:t>
-            </a:r>
-            <a:r>
-              <a:rPr lang="pt-BR" dirty="0" smtClean="0"/>
-              <a:t> ao coletar coisas importantes</a:t>
-            </a:r>
+              <a:t>controls</a:t>
+            </a:r>
+            <a:endParaRPr lang="pt-BR" dirty="0" smtClean="0"/>
           </a:p>
           <a:p>
             <a:r>
@@ -6967,30 +7041,6 @@
             </a:r>
             <a:r>
               <a:rPr lang="pt-BR" dirty="0" smtClean="0"/>
-              <a:t>- plataformas que caem com espetos embaixo</a:t>
-            </a:r>
-          </a:p>
-          <a:p>
-            <a:r>
-              <a:rPr lang="pt-BR" dirty="0"/>
-              <a:t>	</a:t>
-            </a:r>
-            <a:r>
-              <a:rPr lang="pt-BR" dirty="0" smtClean="0"/>
-              <a:t>- desenhar tela para inicio de </a:t>
-            </a:r>
-            <a:r>
-              <a:rPr lang="pt-BR" dirty="0" smtClean="0"/>
-              <a:t>jogo</a:t>
-            </a:r>
-          </a:p>
-          <a:p>
-            <a:r>
-              <a:rPr lang="pt-BR" dirty="0"/>
-              <a:t>	</a:t>
-            </a:r>
-            <a:r>
-              <a:rPr lang="pt-BR" dirty="0" smtClean="0"/>
               <a:t>- </a:t>
             </a:r>
             <a:r>
@@ -6999,11 +7049,19 @@
             </a:r>
             <a:r>
               <a:rPr lang="pt-BR" dirty="0" smtClean="0"/>
-              <a:t> menu </a:t>
+              <a:t> </a:t>
             </a:r>
             <a:r>
               <a:rPr lang="pt-BR" dirty="0" err="1" smtClean="0"/>
-              <a:t>with</a:t>
+              <a:t>save</a:t>
+            </a:r>
+            <a:r>
+              <a:rPr lang="pt-BR" dirty="0" smtClean="0"/>
+              <a:t>/</a:t>
+            </a:r>
+            <a:r>
+              <a:rPr lang="pt-BR" dirty="0" err="1" smtClean="0"/>
+              <a:t>load</a:t>
             </a:r>
             <a:r>
               <a:rPr lang="pt-BR" dirty="0" smtClean="0"/>
@@ -7011,22 +7069,7 @@
             </a:r>
             <a:r>
               <a:rPr lang="pt-BR" dirty="0" err="1" smtClean="0"/>
-              <a:t>controls</a:t>
-            </a:r>
-            <a:endParaRPr lang="pt-BR" dirty="0" smtClean="0"/>
-          </a:p>
-          <a:p>
-            <a:r>
-              <a:rPr lang="pt-BR" dirty="0"/>
-              <a:t>	</a:t>
-            </a:r>
-            <a:r>
-              <a:rPr lang="pt-BR" dirty="0" smtClean="0"/>
-              <a:t>- </a:t>
-            </a:r>
-            <a:r>
-              <a:rPr lang="pt-BR" dirty="0" err="1" smtClean="0"/>
-              <a:t>add</a:t>
+              <a:t>logic</a:t>
             </a:r>
             <a:r>
               <a:rPr lang="pt-BR" dirty="0" smtClean="0"/>
@@ -7034,37 +7077,12 @@
             </a:r>
             <a:r>
               <a:rPr lang="pt-BR" dirty="0" err="1" smtClean="0"/>
-              <a:t>save</a:t>
-            </a:r>
-            <a:r>
-              <a:rPr lang="pt-BR" dirty="0" smtClean="0"/>
-              <a:t>/</a:t>
-            </a:r>
-            <a:r>
-              <a:rPr lang="pt-BR" dirty="0" err="1" smtClean="0"/>
-              <a:t>load</a:t>
-            </a:r>
-            <a:r>
-              <a:rPr lang="pt-BR" dirty="0" smtClean="0"/>
-              <a:t> </a:t>
-            </a:r>
-            <a:r>
-              <a:rPr lang="pt-BR" dirty="0" err="1" smtClean="0"/>
-              <a:t>logic</a:t>
-            </a:r>
-            <a:r>
-              <a:rPr lang="pt-BR" dirty="0" smtClean="0"/>
-              <a:t> </a:t>
-            </a:r>
-            <a:r>
-              <a:rPr lang="pt-BR" dirty="0" err="1" smtClean="0"/>
               <a:t>to</a:t>
             </a:r>
             <a:r>
               <a:rPr lang="pt-BR" dirty="0" smtClean="0"/>
               <a:t> menus</a:t>
             </a:r>
-            <a:endParaRPr lang="pt-BR" dirty="0" smtClean="0"/>
           </a:p>
         </p:txBody>
       </p:sp>

</xml_diff>

<commit_message>
solved timemap flickering problem- fixed by using the "Condition Tile Sheet Texture" menu option on the tile set in the content browser.
</commit_message>
<xml_diff>
--- a/Project Data/Ciclo de trabalho.pptx
+++ b/Project Data/Ciclo de trabalho.pptx
@@ -3416,7 +3416,7 @@
           <a:p>
             <a:fld id="{033C220F-AFE8-4CCC-95E1-E0424241E150}" type="datetimeFigureOut">
               <a:rPr lang="pt-BR" smtClean="0"/>
-              <a:t>15/01/2018</a:t>
+              <a:t>17/01/2018</a:t>
             </a:fld>
             <a:endParaRPr lang="pt-BR"/>
           </a:p>
@@ -3586,7 +3586,7 @@
           <a:p>
             <a:fld id="{033C220F-AFE8-4CCC-95E1-E0424241E150}" type="datetimeFigureOut">
               <a:rPr lang="pt-BR" smtClean="0"/>
-              <a:t>15/01/2018</a:t>
+              <a:t>17/01/2018</a:t>
             </a:fld>
             <a:endParaRPr lang="pt-BR"/>
           </a:p>
@@ -3766,7 +3766,7 @@
           <a:p>
             <a:fld id="{033C220F-AFE8-4CCC-95E1-E0424241E150}" type="datetimeFigureOut">
               <a:rPr lang="pt-BR" smtClean="0"/>
-              <a:t>15/01/2018</a:t>
+              <a:t>17/01/2018</a:t>
             </a:fld>
             <a:endParaRPr lang="pt-BR"/>
           </a:p>
@@ -3936,7 +3936,7 @@
           <a:p>
             <a:fld id="{033C220F-AFE8-4CCC-95E1-E0424241E150}" type="datetimeFigureOut">
               <a:rPr lang="pt-BR" smtClean="0"/>
-              <a:t>15/01/2018</a:t>
+              <a:t>17/01/2018</a:t>
             </a:fld>
             <a:endParaRPr lang="pt-BR"/>
           </a:p>
@@ -4182,7 +4182,7 @@
           <a:p>
             <a:fld id="{033C220F-AFE8-4CCC-95E1-E0424241E150}" type="datetimeFigureOut">
               <a:rPr lang="pt-BR" smtClean="0"/>
-              <a:t>15/01/2018</a:t>
+              <a:t>17/01/2018</a:t>
             </a:fld>
             <a:endParaRPr lang="pt-BR"/>
           </a:p>
@@ -4414,7 +4414,7 @@
           <a:p>
             <a:fld id="{033C220F-AFE8-4CCC-95E1-E0424241E150}" type="datetimeFigureOut">
               <a:rPr lang="pt-BR" smtClean="0"/>
-              <a:t>15/01/2018</a:t>
+              <a:t>17/01/2018</a:t>
             </a:fld>
             <a:endParaRPr lang="pt-BR"/>
           </a:p>
@@ -4781,7 +4781,7 @@
           <a:p>
             <a:fld id="{033C220F-AFE8-4CCC-95E1-E0424241E150}" type="datetimeFigureOut">
               <a:rPr lang="pt-BR" smtClean="0"/>
-              <a:t>15/01/2018</a:t>
+              <a:t>17/01/2018</a:t>
             </a:fld>
             <a:endParaRPr lang="pt-BR"/>
           </a:p>
@@ -4899,7 +4899,7 @@
           <a:p>
             <a:fld id="{033C220F-AFE8-4CCC-95E1-E0424241E150}" type="datetimeFigureOut">
               <a:rPr lang="pt-BR" smtClean="0"/>
-              <a:t>15/01/2018</a:t>
+              <a:t>17/01/2018</a:t>
             </a:fld>
             <a:endParaRPr lang="pt-BR"/>
           </a:p>
@@ -4994,7 +4994,7 @@
           <a:p>
             <a:fld id="{033C220F-AFE8-4CCC-95E1-E0424241E150}" type="datetimeFigureOut">
               <a:rPr lang="pt-BR" smtClean="0"/>
-              <a:t>15/01/2018</a:t>
+              <a:t>17/01/2018</a:t>
             </a:fld>
             <a:endParaRPr lang="pt-BR"/>
           </a:p>
@@ -5271,7 +5271,7 @@
           <a:p>
             <a:fld id="{033C220F-AFE8-4CCC-95E1-E0424241E150}" type="datetimeFigureOut">
               <a:rPr lang="pt-BR" smtClean="0"/>
-              <a:t>15/01/2018</a:t>
+              <a:t>17/01/2018</a:t>
             </a:fld>
             <a:endParaRPr lang="pt-BR"/>
           </a:p>
@@ -5524,7 +5524,7 @@
           <a:p>
             <a:fld id="{033C220F-AFE8-4CCC-95E1-E0424241E150}" type="datetimeFigureOut">
               <a:rPr lang="pt-BR" smtClean="0"/>
-              <a:t>15/01/2018</a:t>
+              <a:t>17/01/2018</a:t>
             </a:fld>
             <a:endParaRPr lang="pt-BR"/>
           </a:p>
@@ -5737,7 +5737,7 @@
           <a:p>
             <a:fld id="{033C220F-AFE8-4CCC-95E1-E0424241E150}" type="datetimeFigureOut">
               <a:rPr lang="pt-BR" smtClean="0"/>
-              <a:t>15/01/2018</a:t>
+              <a:t>17/01/2018</a:t>
             </a:fld>
             <a:endParaRPr lang="pt-BR"/>
           </a:p>
@@ -7013,26 +7013,26 @@
               <a:t>- </a:t>
             </a:r>
             <a:r>
-              <a:rPr lang="pt-BR" dirty="0" err="1" smtClean="0"/>
+              <a:rPr lang="pt-BR" strike="sngStrike" dirty="0" err="1" smtClean="0"/>
               <a:t>add</a:t>
             </a:r>
             <a:r>
-              <a:rPr lang="pt-BR" dirty="0" smtClean="0"/>
+              <a:rPr lang="pt-BR" strike="sngStrike" dirty="0" smtClean="0"/>
               <a:t> menu </a:t>
             </a:r>
             <a:r>
-              <a:rPr lang="pt-BR" dirty="0" err="1" smtClean="0"/>
+              <a:rPr lang="pt-BR" strike="sngStrike" dirty="0" err="1" smtClean="0"/>
               <a:t>with</a:t>
             </a:r>
             <a:r>
-              <a:rPr lang="pt-BR" dirty="0" smtClean="0"/>
+              <a:rPr lang="pt-BR" strike="sngStrike" dirty="0" smtClean="0"/>
               <a:t> </a:t>
             </a:r>
             <a:r>
-              <a:rPr lang="pt-BR" dirty="0" err="1" smtClean="0"/>
+              <a:rPr lang="pt-BR" strike="sngStrike" dirty="0" err="1" smtClean="0"/>
               <a:t>controls</a:t>
             </a:r>
-            <a:endParaRPr lang="pt-BR" dirty="0" smtClean="0"/>
+            <a:endParaRPr lang="pt-BR" strike="sngStrike" dirty="0" smtClean="0"/>
           </a:p>
           <a:p>
             <a:r>

</xml_diff>

<commit_message>
new game /continue widget done
</commit_message>
<xml_diff>
--- a/Project Data/Ciclo de trabalho.pptx
+++ b/Project Data/Ciclo de trabalho.pptx
@@ -3416,7 +3416,7 @@
           <a:p>
             <a:fld id="{033C220F-AFE8-4CCC-95E1-E0424241E150}" type="datetimeFigureOut">
               <a:rPr lang="pt-BR" smtClean="0"/>
-              <a:t>17/01/2018</a:t>
+              <a:t>22/01/2018</a:t>
             </a:fld>
             <a:endParaRPr lang="pt-BR"/>
           </a:p>
@@ -3586,7 +3586,7 @@
           <a:p>
             <a:fld id="{033C220F-AFE8-4CCC-95E1-E0424241E150}" type="datetimeFigureOut">
               <a:rPr lang="pt-BR" smtClean="0"/>
-              <a:t>17/01/2018</a:t>
+              <a:t>22/01/2018</a:t>
             </a:fld>
             <a:endParaRPr lang="pt-BR"/>
           </a:p>
@@ -3766,7 +3766,7 @@
           <a:p>
             <a:fld id="{033C220F-AFE8-4CCC-95E1-E0424241E150}" type="datetimeFigureOut">
               <a:rPr lang="pt-BR" smtClean="0"/>
-              <a:t>17/01/2018</a:t>
+              <a:t>22/01/2018</a:t>
             </a:fld>
             <a:endParaRPr lang="pt-BR"/>
           </a:p>
@@ -3936,7 +3936,7 @@
           <a:p>
             <a:fld id="{033C220F-AFE8-4CCC-95E1-E0424241E150}" type="datetimeFigureOut">
               <a:rPr lang="pt-BR" smtClean="0"/>
-              <a:t>17/01/2018</a:t>
+              <a:t>22/01/2018</a:t>
             </a:fld>
             <a:endParaRPr lang="pt-BR"/>
           </a:p>
@@ -4182,7 +4182,7 @@
           <a:p>
             <a:fld id="{033C220F-AFE8-4CCC-95E1-E0424241E150}" type="datetimeFigureOut">
               <a:rPr lang="pt-BR" smtClean="0"/>
-              <a:t>17/01/2018</a:t>
+              <a:t>22/01/2018</a:t>
             </a:fld>
             <a:endParaRPr lang="pt-BR"/>
           </a:p>
@@ -4414,7 +4414,7 @@
           <a:p>
             <a:fld id="{033C220F-AFE8-4CCC-95E1-E0424241E150}" type="datetimeFigureOut">
               <a:rPr lang="pt-BR" smtClean="0"/>
-              <a:t>17/01/2018</a:t>
+              <a:t>22/01/2018</a:t>
             </a:fld>
             <a:endParaRPr lang="pt-BR"/>
           </a:p>
@@ -4781,7 +4781,7 @@
           <a:p>
             <a:fld id="{033C220F-AFE8-4CCC-95E1-E0424241E150}" type="datetimeFigureOut">
               <a:rPr lang="pt-BR" smtClean="0"/>
-              <a:t>17/01/2018</a:t>
+              <a:t>22/01/2018</a:t>
             </a:fld>
             <a:endParaRPr lang="pt-BR"/>
           </a:p>
@@ -4899,7 +4899,7 @@
           <a:p>
             <a:fld id="{033C220F-AFE8-4CCC-95E1-E0424241E150}" type="datetimeFigureOut">
               <a:rPr lang="pt-BR" smtClean="0"/>
-              <a:t>17/01/2018</a:t>
+              <a:t>22/01/2018</a:t>
             </a:fld>
             <a:endParaRPr lang="pt-BR"/>
           </a:p>
@@ -4994,7 +4994,7 @@
           <a:p>
             <a:fld id="{033C220F-AFE8-4CCC-95E1-E0424241E150}" type="datetimeFigureOut">
               <a:rPr lang="pt-BR" smtClean="0"/>
-              <a:t>17/01/2018</a:t>
+              <a:t>22/01/2018</a:t>
             </a:fld>
             <a:endParaRPr lang="pt-BR"/>
           </a:p>
@@ -5271,7 +5271,7 @@
           <a:p>
             <a:fld id="{033C220F-AFE8-4CCC-95E1-E0424241E150}" type="datetimeFigureOut">
               <a:rPr lang="pt-BR" smtClean="0"/>
-              <a:t>17/01/2018</a:t>
+              <a:t>22/01/2018</a:t>
             </a:fld>
             <a:endParaRPr lang="pt-BR"/>
           </a:p>
@@ -5524,7 +5524,7 @@
           <a:p>
             <a:fld id="{033C220F-AFE8-4CCC-95E1-E0424241E150}" type="datetimeFigureOut">
               <a:rPr lang="pt-BR" smtClean="0"/>
-              <a:t>17/01/2018</a:t>
+              <a:t>22/01/2018</a:t>
             </a:fld>
             <a:endParaRPr lang="pt-BR"/>
           </a:p>
@@ -5737,7 +5737,7 @@
           <a:p>
             <a:fld id="{033C220F-AFE8-4CCC-95E1-E0424241E150}" type="datetimeFigureOut">
               <a:rPr lang="pt-BR" smtClean="0"/>
-              <a:t>17/01/2018</a:t>
+              <a:t>22/01/2018</a:t>
             </a:fld>
             <a:endParaRPr lang="pt-BR"/>
           </a:p>
@@ -6999,7 +6999,7 @@
               <a:t>	</a:t>
             </a:r>
             <a:r>
-              <a:rPr lang="pt-BR" dirty="0" smtClean="0"/>
+              <a:rPr lang="pt-BR" strike="sngStrike" dirty="0" smtClean="0"/>
               <a:t>- desenhar tela para inicio de jogo</a:t>
             </a:r>
           </a:p>
@@ -7040,47 +7040,47 @@
               <a:t>	</a:t>
             </a:r>
             <a:r>
-              <a:rPr lang="pt-BR" dirty="0" smtClean="0"/>
+              <a:rPr lang="pt-BR" strike="sngStrike" dirty="0" smtClean="0"/>
               <a:t>- </a:t>
             </a:r>
             <a:r>
-              <a:rPr lang="pt-BR" dirty="0" err="1" smtClean="0"/>
+              <a:rPr lang="pt-BR" strike="sngStrike" dirty="0" err="1" smtClean="0"/>
               <a:t>add</a:t>
             </a:r>
             <a:r>
-              <a:rPr lang="pt-BR" dirty="0" smtClean="0"/>
+              <a:rPr lang="pt-BR" strike="sngStrike" dirty="0" smtClean="0"/>
               <a:t> </a:t>
             </a:r>
             <a:r>
-              <a:rPr lang="pt-BR" dirty="0" err="1" smtClean="0"/>
+              <a:rPr lang="pt-BR" strike="sngStrike" dirty="0" err="1" smtClean="0"/>
               <a:t>save</a:t>
             </a:r>
             <a:r>
-              <a:rPr lang="pt-BR" dirty="0" smtClean="0"/>
+              <a:rPr lang="pt-BR" strike="sngStrike" dirty="0" smtClean="0"/>
               <a:t>/</a:t>
             </a:r>
             <a:r>
-              <a:rPr lang="pt-BR" dirty="0" err="1" smtClean="0"/>
+              <a:rPr lang="pt-BR" strike="sngStrike" dirty="0" err="1" smtClean="0"/>
               <a:t>load</a:t>
             </a:r>
             <a:r>
-              <a:rPr lang="pt-BR" dirty="0" smtClean="0"/>
+              <a:rPr lang="pt-BR" strike="sngStrike" dirty="0" smtClean="0"/>
               <a:t> </a:t>
             </a:r>
             <a:r>
-              <a:rPr lang="pt-BR" dirty="0" err="1" smtClean="0"/>
+              <a:rPr lang="pt-BR" strike="sngStrike" dirty="0" err="1" smtClean="0"/>
               <a:t>logic</a:t>
             </a:r>
             <a:r>
-              <a:rPr lang="pt-BR" dirty="0" smtClean="0"/>
+              <a:rPr lang="pt-BR" strike="sngStrike" dirty="0" smtClean="0"/>
               <a:t> </a:t>
             </a:r>
             <a:r>
-              <a:rPr lang="pt-BR" dirty="0" err="1" smtClean="0"/>
+              <a:rPr lang="pt-BR" strike="sngStrike" dirty="0" err="1" smtClean="0"/>
               <a:t>to</a:t>
             </a:r>
             <a:r>
-              <a:rPr lang="pt-BR" dirty="0" smtClean="0"/>
+              <a:rPr lang="pt-BR" strike="sngStrike" dirty="0" smtClean="0"/>
               <a:t> menus</a:t>
             </a:r>
           </a:p>

</xml_diff>

<commit_message>
level 1 improve.. ongoing
</commit_message>
<xml_diff>
--- a/Project Data/Ciclo de trabalho.pptx
+++ b/Project Data/Ciclo de trabalho.pptx
@@ -6451,8 +6451,8 @@
         </p:nvSpPr>
         <p:spPr>
           <a:xfrm>
-            <a:off x="8474920" y="3762"/>
-            <a:ext cx="1676857" cy="1277273"/>
+            <a:off x="8478891" y="-30976"/>
+            <a:ext cx="1948021" cy="1277273"/>
           </a:xfrm>
           <a:prstGeom prst="rect">
             <a:avLst/>
@@ -6619,7 +6619,7 @@
         </p:nvSpPr>
         <p:spPr>
           <a:xfrm>
-            <a:off x="9964918" y="923"/>
+            <a:off x="10197299" y="-14467"/>
             <a:ext cx="2125363" cy="1169551"/>
           </a:xfrm>
           <a:prstGeom prst="rect">
@@ -6761,8 +6761,8 @@
         </p:nvSpPr>
         <p:spPr>
           <a:xfrm>
-            <a:off x="5664985" y="1170474"/>
-            <a:ext cx="6337242" cy="2862322"/>
+            <a:off x="5417735" y="1241117"/>
+            <a:ext cx="2408211" cy="1061829"/>
           </a:xfrm>
           <a:prstGeom prst="rect">
             <a:avLst/>
@@ -6776,311 +6776,299 @@
           <a:lstStyle/>
           <a:p>
             <a:r>
-              <a:rPr lang="pt-BR" dirty="0" smtClean="0"/>
+              <a:rPr lang="pt-BR" sz="700" dirty="0" smtClean="0"/>
               <a:t>Sexto ciclo</a:t>
             </a:r>
             <a:r>
-              <a:rPr lang="pt-BR" dirty="0" smtClean="0">
+              <a:rPr lang="pt-BR" sz="700" dirty="0" smtClean="0">
                 <a:sym typeface="Wingdings" panose="05000000000000000000" pitchFamily="2" charset="2"/>
               </a:rPr>
               <a:t>: </a:t>
             </a:r>
             <a:r>
-              <a:rPr lang="pt-BR" strike="sngStrike" dirty="0" smtClean="0">
+              <a:rPr lang="pt-BR" sz="700" strike="sngStrike" dirty="0" smtClean="0">
                 <a:sym typeface="Wingdings" panose="05000000000000000000" pitchFamily="2" charset="2"/>
               </a:rPr>
               <a:t>(</a:t>
             </a:r>
             <a:r>
-              <a:rPr lang="pt-BR" strike="sngStrike" dirty="0" err="1" smtClean="0">
+              <a:rPr lang="pt-BR" sz="700" strike="sngStrike" dirty="0" err="1" smtClean="0">
                 <a:sym typeface="Wingdings" panose="05000000000000000000" pitchFamily="2" charset="2"/>
               </a:rPr>
               <a:t>QuickRefactor</a:t>
             </a:r>
             <a:r>
-              <a:rPr lang="pt-BR" strike="sngStrike" dirty="0" smtClean="0">
+              <a:rPr lang="pt-BR" sz="700" strike="sngStrike" dirty="0" smtClean="0">
                 <a:sym typeface="Wingdings" panose="05000000000000000000" pitchFamily="2" charset="2"/>
               </a:rPr>
               <a:t>)</a:t>
             </a:r>
-            <a:endParaRPr lang="pt-BR" strike="sngStrike" dirty="0" smtClean="0"/>
-          </a:p>
-          <a:p>
-            <a:r>
-              <a:rPr lang="pt-BR" dirty="0" smtClean="0"/>
-              <a:t>	- </a:t>
-            </a:r>
-            <a:r>
-              <a:rPr lang="pt-BR" strike="sngStrike" dirty="0" smtClean="0"/>
+            <a:endParaRPr lang="pt-BR" sz="700" strike="sngStrike" dirty="0" smtClean="0"/>
+          </a:p>
+          <a:p>
+            <a:r>
+              <a:rPr lang="pt-BR" sz="700" dirty="0" smtClean="0"/>
+              <a:t>- </a:t>
+            </a:r>
+            <a:r>
+              <a:rPr lang="pt-BR" sz="700" strike="sngStrike" dirty="0" smtClean="0"/>
               <a:t>Concluir </a:t>
             </a:r>
             <a:r>
-              <a:rPr lang="pt-BR" strike="sngStrike" dirty="0" err="1" smtClean="0"/>
+              <a:rPr lang="pt-BR" sz="700" strike="sngStrike" dirty="0" err="1" smtClean="0"/>
               <a:t>level</a:t>
             </a:r>
             <a:r>
-              <a:rPr lang="pt-BR" strike="sngStrike" dirty="0" smtClean="0"/>
+              <a:rPr lang="pt-BR" sz="700" strike="sngStrike" dirty="0" smtClean="0"/>
               <a:t> 1 e carregar informações para próximo </a:t>
             </a:r>
             <a:r>
-              <a:rPr lang="pt-BR" strike="sngStrike" dirty="0" err="1" smtClean="0"/>
+              <a:rPr lang="pt-BR" sz="700" strike="sngStrike" dirty="0" err="1" smtClean="0"/>
               <a:t>level</a:t>
             </a:r>
-            <a:endParaRPr lang="pt-BR" strike="sngStrike" dirty="0" smtClean="0"/>
-          </a:p>
-          <a:p>
-            <a:r>
-              <a:rPr lang="pt-BR" dirty="0"/>
-              <a:t>	</a:t>
-            </a:r>
-            <a:r>
-              <a:rPr lang="pt-BR" strike="sngStrike" dirty="0" smtClean="0"/>
-              <a:t>- Desenhar animações </a:t>
-            </a:r>
-            <a:r>
-              <a:rPr lang="pt-BR" strike="sngStrike" dirty="0" err="1" smtClean="0"/>
+            <a:endParaRPr lang="pt-BR" sz="700" strike="sngStrike" dirty="0" smtClean="0"/>
+          </a:p>
+          <a:p>
+            <a:r>
+              <a:rPr lang="pt-BR" sz="700" strike="sngStrike" dirty="0" smtClean="0"/>
+              <a:t>- </a:t>
+            </a:r>
+            <a:r>
+              <a:rPr lang="pt-BR" sz="700" strike="sngStrike" dirty="0" smtClean="0"/>
+              <a:t>Desenhar animações </a:t>
+            </a:r>
+            <a:r>
+              <a:rPr lang="pt-BR" sz="700" strike="sngStrike" dirty="0" err="1" smtClean="0"/>
               <a:t>add</a:t>
             </a:r>
             <a:r>
-              <a:rPr lang="pt-BR" strike="sngStrike" dirty="0" smtClean="0"/>
+              <a:rPr lang="pt-BR" sz="700" strike="sngStrike" dirty="0" smtClean="0"/>
               <a:t> </a:t>
             </a:r>
             <a:r>
-              <a:rPr lang="pt-BR" strike="sngStrike" dirty="0" err="1" smtClean="0"/>
+              <a:rPr lang="pt-BR" sz="700" strike="sngStrike" dirty="0" err="1" smtClean="0"/>
               <a:t>detail</a:t>
             </a:r>
             <a:r>
-              <a:rPr lang="pt-BR" strike="sngStrike" dirty="0" smtClean="0"/>
+              <a:rPr lang="pt-BR" sz="700" strike="sngStrike" dirty="0" smtClean="0"/>
               <a:t> in </a:t>
             </a:r>
             <a:r>
-              <a:rPr lang="pt-BR" strike="sngStrike" dirty="0" err="1" smtClean="0"/>
+              <a:rPr lang="pt-BR" sz="700" strike="sngStrike" dirty="0" err="1" smtClean="0"/>
               <a:t>existing</a:t>
             </a:r>
             <a:r>
-              <a:rPr lang="pt-BR" strike="sngStrike" dirty="0" smtClean="0"/>
+              <a:rPr lang="pt-BR" sz="700" strike="sngStrike" dirty="0" smtClean="0"/>
               <a:t> </a:t>
             </a:r>
             <a:r>
-              <a:rPr lang="pt-BR" strike="sngStrike" dirty="0" err="1" smtClean="0"/>
+              <a:rPr lang="pt-BR" sz="700" strike="sngStrike" dirty="0" err="1" smtClean="0"/>
               <a:t>ones</a:t>
             </a:r>
             <a:r>
-              <a:rPr lang="pt-BR" strike="sngStrike" dirty="0" smtClean="0"/>
+              <a:rPr lang="pt-BR" sz="700" strike="sngStrike" dirty="0" smtClean="0"/>
               <a:t>(</a:t>
             </a:r>
             <a:r>
-              <a:rPr lang="pt-BR" strike="sngStrike" dirty="0" err="1" smtClean="0"/>
+              <a:rPr lang="pt-BR" sz="700" strike="sngStrike" dirty="0" err="1" smtClean="0"/>
               <a:t>jump</a:t>
             </a:r>
             <a:r>
-              <a:rPr lang="pt-BR" strike="sngStrike" dirty="0" smtClean="0"/>
+              <a:rPr lang="pt-BR" sz="700" strike="sngStrike" dirty="0" smtClean="0"/>
               <a:t> </a:t>
             </a:r>
             <a:r>
-              <a:rPr lang="pt-BR" strike="sngStrike" dirty="0" err="1" smtClean="0"/>
+              <a:rPr lang="pt-BR" sz="700" strike="sngStrike" dirty="0" err="1" smtClean="0"/>
               <a:t>fall</a:t>
             </a:r>
             <a:r>
-              <a:rPr lang="pt-BR" strike="sngStrike" dirty="0" smtClean="0"/>
+              <a:rPr lang="pt-BR" sz="700" strike="sngStrike" dirty="0" smtClean="0"/>
               <a:t> </a:t>
             </a:r>
             <a:r>
-              <a:rPr lang="pt-BR" strike="sngStrike" dirty="0" err="1" smtClean="0"/>
+              <a:rPr lang="pt-BR" sz="700" strike="sngStrike" dirty="0" err="1" smtClean="0"/>
               <a:t>wall</a:t>
             </a:r>
             <a:r>
-              <a:rPr lang="pt-BR" strike="sngStrike" dirty="0" smtClean="0"/>
+              <a:rPr lang="pt-BR" sz="700" strike="sngStrike" dirty="0" smtClean="0"/>
               <a:t> slide </a:t>
             </a:r>
             <a:r>
-              <a:rPr lang="pt-BR" strike="sngStrike" dirty="0" err="1" smtClean="0"/>
+              <a:rPr lang="pt-BR" sz="700" strike="sngStrike" dirty="0" err="1" smtClean="0"/>
               <a:t>run</a:t>
             </a:r>
             <a:r>
-              <a:rPr lang="pt-BR" strike="sngStrike" dirty="0" smtClean="0"/>
+              <a:rPr lang="pt-BR" sz="700" strike="sngStrike" dirty="0" smtClean="0"/>
               <a:t> </a:t>
             </a:r>
             <a:r>
-              <a:rPr lang="pt-BR" strike="sngStrike" dirty="0" err="1" smtClean="0"/>
+              <a:rPr lang="pt-BR" sz="700" strike="sngStrike" dirty="0" err="1" smtClean="0"/>
               <a:t>walk</a:t>
             </a:r>
             <a:r>
-              <a:rPr lang="pt-BR" strike="sngStrike" dirty="0" smtClean="0"/>
+              <a:rPr lang="pt-BR" sz="700" strike="sngStrike" dirty="0" smtClean="0"/>
               <a:t>), hit, </a:t>
             </a:r>
             <a:r>
-              <a:rPr lang="pt-BR" strike="sngStrike" dirty="0" err="1" smtClean="0"/>
+              <a:rPr lang="pt-BR" sz="700" strike="sngStrike" dirty="0" err="1" smtClean="0"/>
               <a:t>death</a:t>
             </a:r>
-            <a:endParaRPr lang="pt-BR" strike="sngStrike" dirty="0" smtClean="0"/>
-          </a:p>
-          <a:p>
-            <a:r>
-              <a:rPr lang="pt-BR" dirty="0"/>
-              <a:t>	</a:t>
-            </a:r>
-            <a:r>
-              <a:rPr lang="pt-BR" strike="sngStrike" dirty="0" smtClean="0"/>
-              <a:t>- Controles – programar um </a:t>
-            </a:r>
-            <a:r>
-              <a:rPr lang="pt-BR" strike="sngStrike" dirty="0" err="1" smtClean="0"/>
+            <a:endParaRPr lang="pt-BR" sz="700" strike="sngStrike" dirty="0" smtClean="0"/>
+          </a:p>
+          <a:p>
+            <a:r>
+              <a:rPr lang="pt-BR" sz="700" strike="sngStrike" dirty="0" smtClean="0"/>
+              <a:t>- </a:t>
+            </a:r>
+            <a:r>
+              <a:rPr lang="pt-BR" sz="700" strike="sngStrike" dirty="0" smtClean="0"/>
+              <a:t>Controles – programar um </a:t>
+            </a:r>
+            <a:r>
+              <a:rPr lang="pt-BR" sz="700" strike="sngStrike" dirty="0" err="1" smtClean="0"/>
               <a:t>dash</a:t>
             </a:r>
-            <a:endParaRPr lang="pt-BR" strike="sngStrike" dirty="0" smtClean="0"/>
-          </a:p>
-          <a:p>
-            <a:r>
-              <a:rPr lang="pt-BR" dirty="0"/>
-              <a:t>	</a:t>
-            </a:r>
-            <a:r>
-              <a:rPr lang="pt-BR" strike="sngStrike" dirty="0" smtClean="0"/>
+            <a:endParaRPr lang="pt-BR" sz="700" strike="sngStrike" dirty="0" smtClean="0"/>
+          </a:p>
+          <a:p>
+            <a:r>
+              <a:rPr lang="pt-BR" sz="700" strike="sngStrike" dirty="0" smtClean="0"/>
               <a:t>- </a:t>
             </a:r>
             <a:r>
-              <a:rPr lang="pt-BR" strike="sngStrike" dirty="0" err="1" smtClean="0"/>
+              <a:rPr lang="pt-BR" sz="700" strike="sngStrike" dirty="0" err="1" smtClean="0"/>
               <a:t>spikes</a:t>
             </a:r>
             <a:r>
-              <a:rPr lang="pt-BR" strike="sngStrike" dirty="0" smtClean="0"/>
+              <a:rPr lang="pt-BR" sz="700" strike="sngStrike" dirty="0" smtClean="0"/>
               <a:t> </a:t>
             </a:r>
             <a:r>
-              <a:rPr lang="pt-BR" strike="sngStrike" dirty="0" err="1" smtClean="0"/>
+              <a:rPr lang="pt-BR" sz="700" strike="sngStrike" dirty="0" err="1" smtClean="0"/>
               <a:t>keeps</a:t>
             </a:r>
             <a:r>
-              <a:rPr lang="pt-BR" strike="sngStrike" dirty="0" smtClean="0"/>
+              <a:rPr lang="pt-BR" sz="700" strike="sngStrike" dirty="0" smtClean="0"/>
               <a:t> </a:t>
             </a:r>
             <a:r>
-              <a:rPr lang="pt-BR" strike="sngStrike" dirty="0" err="1" smtClean="0"/>
+              <a:rPr lang="pt-BR" sz="700" strike="sngStrike" dirty="0" err="1" smtClean="0"/>
               <a:t>damaging</a:t>
             </a:r>
             <a:r>
-              <a:rPr lang="pt-BR" strike="sngStrike" dirty="0" smtClean="0"/>
+              <a:rPr lang="pt-BR" sz="700" strike="sngStrike" dirty="0" smtClean="0"/>
               <a:t> </a:t>
             </a:r>
             <a:r>
-              <a:rPr lang="pt-BR" strike="sngStrike" dirty="0" err="1" smtClean="0"/>
+              <a:rPr lang="pt-BR" sz="700" strike="sngStrike" dirty="0" err="1" smtClean="0"/>
               <a:t>if</a:t>
             </a:r>
             <a:r>
-              <a:rPr lang="pt-BR" strike="sngStrike" dirty="0" smtClean="0"/>
+              <a:rPr lang="pt-BR" sz="700" strike="sngStrike" dirty="0" smtClean="0"/>
               <a:t> </a:t>
             </a:r>
             <a:r>
-              <a:rPr lang="pt-BR" strike="sngStrike" dirty="0" err="1" smtClean="0"/>
+              <a:rPr lang="pt-BR" sz="700" strike="sngStrike" dirty="0" err="1" smtClean="0"/>
               <a:t>inside</a:t>
             </a:r>
             <a:r>
-              <a:rPr lang="pt-BR" strike="sngStrike" dirty="0" smtClean="0"/>
+              <a:rPr lang="pt-BR" sz="700" strike="sngStrike" dirty="0" smtClean="0"/>
               <a:t> </a:t>
             </a:r>
             <a:r>
-              <a:rPr lang="pt-BR" strike="sngStrike" dirty="0" err="1" smtClean="0"/>
+              <a:rPr lang="pt-BR" sz="700" strike="sngStrike" dirty="0" err="1" smtClean="0"/>
               <a:t>colision</a:t>
             </a:r>
             <a:r>
-              <a:rPr lang="pt-BR" strike="sngStrike" dirty="0" smtClean="0"/>
+              <a:rPr lang="pt-BR" sz="700" strike="sngStrike" dirty="0" smtClean="0"/>
               <a:t> </a:t>
             </a:r>
             <a:r>
-              <a:rPr lang="pt-BR" strike="sngStrike" dirty="0" err="1" smtClean="0"/>
+              <a:rPr lang="pt-BR" sz="700" strike="sngStrike" dirty="0" err="1" smtClean="0"/>
               <a:t>area</a:t>
             </a:r>
-            <a:endParaRPr lang="pt-BR" strike="sngStrike" dirty="0" smtClean="0"/>
-          </a:p>
-          <a:p>
-            <a:r>
-              <a:rPr lang="pt-BR" dirty="0"/>
-              <a:t>	</a:t>
-            </a:r>
-            <a:r>
-              <a:rPr lang="pt-BR" strike="sngStrike" dirty="0" smtClean="0"/>
-              <a:t>- desenhar tela para inicio de jogo</a:t>
-            </a:r>
-          </a:p>
-          <a:p>
-            <a:r>
-              <a:rPr lang="pt-BR" dirty="0"/>
-              <a:t>	</a:t>
-            </a:r>
-            <a:r>
-              <a:rPr lang="pt-BR" dirty="0" smtClean="0"/>
+            <a:endParaRPr lang="pt-BR" sz="700" strike="sngStrike" dirty="0" smtClean="0"/>
+          </a:p>
+          <a:p>
+            <a:r>
+              <a:rPr lang="pt-BR" sz="700" strike="sngStrike" dirty="0" smtClean="0"/>
               <a:t>- </a:t>
             </a:r>
             <a:r>
-              <a:rPr lang="pt-BR" strike="sngStrike" dirty="0" err="1" smtClean="0"/>
+              <a:rPr lang="pt-BR" sz="700" strike="sngStrike" dirty="0" smtClean="0"/>
+              <a:t>desenhar tela para inicio de jogo</a:t>
+            </a:r>
+          </a:p>
+          <a:p>
+            <a:r>
+              <a:rPr lang="pt-BR" sz="700" dirty="0" smtClean="0"/>
+              <a:t>- </a:t>
+            </a:r>
+            <a:r>
+              <a:rPr lang="pt-BR" sz="700" strike="sngStrike" dirty="0" err="1" smtClean="0"/>
               <a:t>add</a:t>
             </a:r>
             <a:r>
-              <a:rPr lang="pt-BR" strike="sngStrike" dirty="0" smtClean="0"/>
+              <a:rPr lang="pt-BR" sz="700" strike="sngStrike" dirty="0" smtClean="0"/>
               <a:t> menu </a:t>
             </a:r>
             <a:r>
-              <a:rPr lang="pt-BR" strike="sngStrike" dirty="0" err="1" smtClean="0"/>
+              <a:rPr lang="pt-BR" sz="700" strike="sngStrike" dirty="0" err="1" smtClean="0"/>
               <a:t>with</a:t>
             </a:r>
             <a:r>
-              <a:rPr lang="pt-BR" strike="sngStrike" dirty="0" smtClean="0"/>
+              <a:rPr lang="pt-BR" sz="700" strike="sngStrike" dirty="0" smtClean="0"/>
               <a:t> </a:t>
             </a:r>
             <a:r>
-              <a:rPr lang="pt-BR" strike="sngStrike" dirty="0" err="1" smtClean="0"/>
+              <a:rPr lang="pt-BR" sz="700" strike="sngStrike" dirty="0" err="1" smtClean="0"/>
               <a:t>controls</a:t>
             </a:r>
-            <a:endParaRPr lang="pt-BR" strike="sngStrike" dirty="0" smtClean="0"/>
-          </a:p>
-          <a:p>
-            <a:r>
-              <a:rPr lang="pt-BR" dirty="0"/>
-              <a:t>	</a:t>
-            </a:r>
-            <a:r>
-              <a:rPr lang="pt-BR" strike="sngStrike" dirty="0" smtClean="0"/>
+            <a:endParaRPr lang="pt-BR" sz="700" strike="sngStrike" dirty="0" smtClean="0"/>
+          </a:p>
+          <a:p>
+            <a:r>
+              <a:rPr lang="pt-BR" sz="700" strike="sngStrike" dirty="0" smtClean="0"/>
               <a:t>- </a:t>
             </a:r>
             <a:r>
-              <a:rPr lang="pt-BR" strike="sngStrike" dirty="0" err="1" smtClean="0"/>
+              <a:rPr lang="pt-BR" sz="700" strike="sngStrike" dirty="0" err="1" smtClean="0"/>
               <a:t>add</a:t>
             </a:r>
             <a:r>
-              <a:rPr lang="pt-BR" strike="sngStrike" dirty="0" smtClean="0"/>
+              <a:rPr lang="pt-BR" sz="700" strike="sngStrike" dirty="0" smtClean="0"/>
               <a:t> </a:t>
             </a:r>
             <a:r>
-              <a:rPr lang="pt-BR" strike="sngStrike" dirty="0" err="1" smtClean="0"/>
+              <a:rPr lang="pt-BR" sz="700" strike="sngStrike" dirty="0" err="1" smtClean="0"/>
               <a:t>save</a:t>
             </a:r>
             <a:r>
-              <a:rPr lang="pt-BR" strike="sngStrike" dirty="0" smtClean="0"/>
+              <a:rPr lang="pt-BR" sz="700" strike="sngStrike" dirty="0" smtClean="0"/>
               <a:t>/</a:t>
             </a:r>
             <a:r>
-              <a:rPr lang="pt-BR" strike="sngStrike" dirty="0" err="1" smtClean="0"/>
+              <a:rPr lang="pt-BR" sz="700" strike="sngStrike" dirty="0" err="1" smtClean="0"/>
               <a:t>load</a:t>
             </a:r>
             <a:r>
-              <a:rPr lang="pt-BR" strike="sngStrike" dirty="0" smtClean="0"/>
+              <a:rPr lang="pt-BR" sz="700" strike="sngStrike" dirty="0" smtClean="0"/>
               <a:t> </a:t>
             </a:r>
             <a:r>
-              <a:rPr lang="pt-BR" strike="sngStrike" dirty="0" err="1" smtClean="0"/>
+              <a:rPr lang="pt-BR" sz="700" strike="sngStrike" dirty="0" err="1" smtClean="0"/>
               <a:t>logic</a:t>
             </a:r>
             <a:r>
-              <a:rPr lang="pt-BR" strike="sngStrike" dirty="0" smtClean="0"/>
+              <a:rPr lang="pt-BR" sz="700" strike="sngStrike" dirty="0" smtClean="0"/>
               <a:t> </a:t>
             </a:r>
             <a:r>
-              <a:rPr lang="pt-BR" strike="sngStrike" dirty="0" err="1" smtClean="0"/>
+              <a:rPr lang="pt-BR" sz="700" strike="sngStrike" dirty="0" err="1" smtClean="0"/>
               <a:t>to</a:t>
             </a:r>
             <a:r>
-              <a:rPr lang="pt-BR" strike="sngStrike" dirty="0" smtClean="0"/>
+              <a:rPr lang="pt-BR" sz="700" strike="sngStrike" dirty="0" smtClean="0"/>
               <a:t> menus</a:t>
             </a:r>
           </a:p>
@@ -7194,6 +7182,168 @@
             <a:r>
               <a:rPr lang="pt-BR" sz="900" dirty="0" smtClean="0"/>
               <a:t>Menus e UI: Tem que ter e tem que ser bom</a:t>
+            </a:r>
+          </a:p>
+        </p:txBody>
+      </p:sp>
+      <p:sp>
+        <p:nvSpPr>
+          <p:cNvPr id="12" name="CaixaDeTexto 11"/>
+          <p:cNvSpPr txBox="1"/>
+          <p:nvPr/>
+        </p:nvSpPr>
+        <p:spPr>
+          <a:xfrm>
+            <a:off x="5937363" y="2564207"/>
+            <a:ext cx="6337242" cy="2308324"/>
+          </a:xfrm>
+          <a:prstGeom prst="rect">
+            <a:avLst/>
+          </a:prstGeom>
+          <a:noFill/>
+        </p:spPr>
+        <p:txBody>
+          <a:bodyPr wrap="square" rtlCol="0">
+            <a:spAutoFit/>
+          </a:bodyPr>
+          <a:lstStyle/>
+          <a:p>
+            <a:r>
+              <a:rPr lang="pt-BR" dirty="0" smtClean="0"/>
+              <a:t>Sétimo ciclo</a:t>
+            </a:r>
+            <a:r>
+              <a:rPr lang="pt-BR" dirty="0" smtClean="0">
+                <a:sym typeface="Wingdings" panose="05000000000000000000" pitchFamily="2" charset="2"/>
+              </a:rPr>
+              <a:t>: (</a:t>
+            </a:r>
+            <a:r>
+              <a:rPr lang="pt-BR" dirty="0" err="1" smtClean="0">
+                <a:sym typeface="Wingdings" panose="05000000000000000000" pitchFamily="2" charset="2"/>
+              </a:rPr>
+              <a:t>QuickRefactor</a:t>
+            </a:r>
+            <a:r>
+              <a:rPr lang="pt-BR" dirty="0" smtClean="0">
+                <a:sym typeface="Wingdings" panose="05000000000000000000" pitchFamily="2" charset="2"/>
+              </a:rPr>
+              <a:t>)</a:t>
+            </a:r>
+            <a:endParaRPr lang="pt-BR" dirty="0" smtClean="0"/>
+          </a:p>
+          <a:p>
+            <a:r>
+              <a:rPr lang="pt-BR" dirty="0" smtClean="0"/>
+              <a:t>	- </a:t>
+            </a:r>
+            <a:r>
+              <a:rPr lang="pt-BR" dirty="0" smtClean="0"/>
+              <a:t>Aumentar o nível 1 e Concluir </a:t>
+            </a:r>
+            <a:r>
+              <a:rPr lang="pt-BR" dirty="0" err="1" smtClean="0"/>
+              <a:t>level</a:t>
+            </a:r>
+            <a:r>
+              <a:rPr lang="pt-BR" dirty="0" smtClean="0"/>
+              <a:t> </a:t>
+            </a:r>
+            <a:r>
+              <a:rPr lang="pt-BR" dirty="0" smtClean="0"/>
+              <a:t>2 </a:t>
+            </a:r>
+            <a:r>
+              <a:rPr lang="pt-BR" dirty="0" err="1" smtClean="0"/>
+              <a:t>level</a:t>
+            </a:r>
+            <a:r>
+              <a:rPr lang="pt-BR" dirty="0" smtClean="0"/>
+              <a:t> </a:t>
+            </a:r>
+            <a:r>
+              <a:rPr lang="pt-BR" dirty="0" err="1" smtClean="0"/>
+              <a:t>desing</a:t>
+            </a:r>
+            <a:endParaRPr lang="pt-BR" dirty="0" smtClean="0"/>
+          </a:p>
+          <a:p>
+            <a:r>
+              <a:rPr lang="pt-BR" dirty="0"/>
+              <a:t>	</a:t>
+            </a:r>
+            <a:r>
+              <a:rPr lang="pt-BR" dirty="0" smtClean="0"/>
+              <a:t>- </a:t>
+            </a:r>
+            <a:r>
+              <a:rPr lang="pt-BR" dirty="0" smtClean="0"/>
+              <a:t>Animar o Dash	</a:t>
+            </a:r>
+          </a:p>
+          <a:p>
+            <a:r>
+              <a:rPr lang="pt-BR" dirty="0"/>
+              <a:t>	</a:t>
+            </a:r>
+            <a:r>
+              <a:rPr lang="pt-BR" dirty="0" smtClean="0"/>
+              <a:t>- </a:t>
+            </a:r>
+            <a:r>
+              <a:rPr lang="pt-BR" dirty="0" smtClean="0"/>
+              <a:t>Melhorar a Bomba (e o seu UI)</a:t>
+            </a:r>
+          </a:p>
+          <a:p>
+            <a:r>
+              <a:rPr lang="pt-BR" dirty="0"/>
+              <a:t>	</a:t>
+            </a:r>
+            <a:r>
+              <a:rPr lang="pt-BR" dirty="0" smtClean="0"/>
+              <a:t>- </a:t>
+            </a:r>
+            <a:r>
+              <a:rPr lang="pt-BR" dirty="0" smtClean="0"/>
+              <a:t>Fazer parede esmagadora (ver como fazer isso de se a colisão for menor que a área do personagem esmagar ele)</a:t>
+            </a:r>
+            <a:endParaRPr lang="pt-BR" dirty="0" smtClean="0"/>
+          </a:p>
+          <a:p>
+            <a:r>
+              <a:rPr lang="pt-BR" dirty="0"/>
+              <a:t>	</a:t>
+            </a:r>
+            <a:r>
+              <a:rPr lang="pt-BR" dirty="0" smtClean="0"/>
+              <a:t>- </a:t>
+            </a:r>
+            <a:r>
+              <a:rPr lang="pt-BR" dirty="0" smtClean="0"/>
+              <a:t>Programar a cobra criada</a:t>
+            </a:r>
+          </a:p>
+          <a:p>
+            <a:r>
+              <a:rPr lang="pt-BR" dirty="0"/>
+              <a:t>	</a:t>
+            </a:r>
+            <a:r>
+              <a:rPr lang="pt-BR" dirty="0" smtClean="0"/>
+              <a:t>- </a:t>
+            </a:r>
+            <a:r>
+              <a:rPr lang="pt-BR" dirty="0" smtClean="0"/>
+              <a:t>Mais detalhe no background do </a:t>
+            </a:r>
+            <a:r>
+              <a:rPr lang="pt-BR" dirty="0" err="1" smtClean="0"/>
+              <a:t>main</a:t>
+            </a:r>
+            <a:r>
+              <a:rPr lang="pt-BR" dirty="0" smtClean="0"/>
+              <a:t> menu</a:t>
             </a:r>
           </a:p>
         </p:txBody>

</xml_diff>

<commit_message>
PAralax is success- resulvido mudando rotate control para rotate sprite. ao rodar o controle por um frame a camera movia junto e voltava a ficar correta e isso atrapalhava em fazer a paralaxe baseada na camera ja que esta tem um lag que eu nao saberia calcular usando a posição do personagem
</commit_message>
<xml_diff>
--- a/Project Data/Ciclo de trabalho.pptx
+++ b/Project Data/Ciclo de trabalho.pptx
@@ -3416,7 +3416,7 @@
           <a:p>
             <a:fld id="{033C220F-AFE8-4CCC-95E1-E0424241E150}" type="datetimeFigureOut">
               <a:rPr lang="pt-BR" smtClean="0"/>
-              <a:t>22/01/2018</a:t>
+              <a:t>06/02/2018</a:t>
             </a:fld>
             <a:endParaRPr lang="pt-BR"/>
           </a:p>
@@ -3586,7 +3586,7 @@
           <a:p>
             <a:fld id="{033C220F-AFE8-4CCC-95E1-E0424241E150}" type="datetimeFigureOut">
               <a:rPr lang="pt-BR" smtClean="0"/>
-              <a:t>22/01/2018</a:t>
+              <a:t>06/02/2018</a:t>
             </a:fld>
             <a:endParaRPr lang="pt-BR"/>
           </a:p>
@@ -3766,7 +3766,7 @@
           <a:p>
             <a:fld id="{033C220F-AFE8-4CCC-95E1-E0424241E150}" type="datetimeFigureOut">
               <a:rPr lang="pt-BR" smtClean="0"/>
-              <a:t>22/01/2018</a:t>
+              <a:t>06/02/2018</a:t>
             </a:fld>
             <a:endParaRPr lang="pt-BR"/>
           </a:p>
@@ -3936,7 +3936,7 @@
           <a:p>
             <a:fld id="{033C220F-AFE8-4CCC-95E1-E0424241E150}" type="datetimeFigureOut">
               <a:rPr lang="pt-BR" smtClean="0"/>
-              <a:t>22/01/2018</a:t>
+              <a:t>06/02/2018</a:t>
             </a:fld>
             <a:endParaRPr lang="pt-BR"/>
           </a:p>
@@ -4182,7 +4182,7 @@
           <a:p>
             <a:fld id="{033C220F-AFE8-4CCC-95E1-E0424241E150}" type="datetimeFigureOut">
               <a:rPr lang="pt-BR" smtClean="0"/>
-              <a:t>22/01/2018</a:t>
+              <a:t>06/02/2018</a:t>
             </a:fld>
             <a:endParaRPr lang="pt-BR"/>
           </a:p>
@@ -4414,7 +4414,7 @@
           <a:p>
             <a:fld id="{033C220F-AFE8-4CCC-95E1-E0424241E150}" type="datetimeFigureOut">
               <a:rPr lang="pt-BR" smtClean="0"/>
-              <a:t>22/01/2018</a:t>
+              <a:t>06/02/2018</a:t>
             </a:fld>
             <a:endParaRPr lang="pt-BR"/>
           </a:p>
@@ -4781,7 +4781,7 @@
           <a:p>
             <a:fld id="{033C220F-AFE8-4CCC-95E1-E0424241E150}" type="datetimeFigureOut">
               <a:rPr lang="pt-BR" smtClean="0"/>
-              <a:t>22/01/2018</a:t>
+              <a:t>06/02/2018</a:t>
             </a:fld>
             <a:endParaRPr lang="pt-BR"/>
           </a:p>
@@ -4899,7 +4899,7 @@
           <a:p>
             <a:fld id="{033C220F-AFE8-4CCC-95E1-E0424241E150}" type="datetimeFigureOut">
               <a:rPr lang="pt-BR" smtClean="0"/>
-              <a:t>22/01/2018</a:t>
+              <a:t>06/02/2018</a:t>
             </a:fld>
             <a:endParaRPr lang="pt-BR"/>
           </a:p>
@@ -4994,7 +4994,7 @@
           <a:p>
             <a:fld id="{033C220F-AFE8-4CCC-95E1-E0424241E150}" type="datetimeFigureOut">
               <a:rPr lang="pt-BR" smtClean="0"/>
-              <a:t>22/01/2018</a:t>
+              <a:t>06/02/2018</a:t>
             </a:fld>
             <a:endParaRPr lang="pt-BR"/>
           </a:p>
@@ -5271,7 +5271,7 @@
           <a:p>
             <a:fld id="{033C220F-AFE8-4CCC-95E1-E0424241E150}" type="datetimeFigureOut">
               <a:rPr lang="pt-BR" smtClean="0"/>
-              <a:t>22/01/2018</a:t>
+              <a:t>06/02/2018</a:t>
             </a:fld>
             <a:endParaRPr lang="pt-BR"/>
           </a:p>
@@ -5524,7 +5524,7 @@
           <a:p>
             <a:fld id="{033C220F-AFE8-4CCC-95E1-E0424241E150}" type="datetimeFigureOut">
               <a:rPr lang="pt-BR" smtClean="0"/>
-              <a:t>22/01/2018</a:t>
+              <a:t>06/02/2018</a:t>
             </a:fld>
             <a:endParaRPr lang="pt-BR"/>
           </a:p>
@@ -5737,7 +5737,7 @@
           <a:p>
             <a:fld id="{033C220F-AFE8-4CCC-95E1-E0424241E150}" type="datetimeFigureOut">
               <a:rPr lang="pt-BR" smtClean="0"/>
-              <a:t>22/01/2018</a:t>
+              <a:t>06/02/2018</a:t>
             </a:fld>
             <a:endParaRPr lang="pt-BR"/>
           </a:p>
@@ -6831,11 +6831,7 @@
           <a:p>
             <a:r>
               <a:rPr lang="pt-BR" sz="700" strike="sngStrike" dirty="0" smtClean="0"/>
-              <a:t>- </a:t>
-            </a:r>
-            <a:r>
-              <a:rPr lang="pt-BR" sz="700" strike="sngStrike" dirty="0" smtClean="0"/>
-              <a:t>Desenhar animações </a:t>
+              <a:t>- Desenhar animações </a:t>
             </a:r>
             <a:r>
               <a:rPr lang="pt-BR" sz="700" strike="sngStrike" dirty="0" err="1" smtClean="0"/>
@@ -6918,11 +6914,7 @@
           <a:p>
             <a:r>
               <a:rPr lang="pt-BR" sz="700" strike="sngStrike" dirty="0" smtClean="0"/>
-              <a:t>- </a:t>
-            </a:r>
-            <a:r>
-              <a:rPr lang="pt-BR" sz="700" strike="sngStrike" dirty="0" smtClean="0"/>
-              <a:t>Controles – programar um </a:t>
+              <a:t>- Controles – programar um </a:t>
             </a:r>
             <a:r>
               <a:rPr lang="pt-BR" sz="700" strike="sngStrike" dirty="0" err="1" smtClean="0"/>
@@ -6992,11 +6984,7 @@
           <a:p>
             <a:r>
               <a:rPr lang="pt-BR" sz="700" strike="sngStrike" dirty="0" smtClean="0"/>
-              <a:t>- </a:t>
-            </a:r>
-            <a:r>
-              <a:rPr lang="pt-BR" sz="700" strike="sngStrike" dirty="0" smtClean="0"/>
-              <a:t>desenhar tela para inicio de jogo</a:t>
+              <a:t>- desenhar tela para inicio de jogo</a:t>
             </a:r>
           </a:p>
           <a:p>
@@ -7235,11 +7223,11 @@
           <a:p>
             <a:r>
               <a:rPr lang="pt-BR" dirty="0" smtClean="0"/>
-              <a:t>	- </a:t>
+              <a:t>	- Aumentar o </a:t>
             </a:r>
             <a:r>
               <a:rPr lang="pt-BR" dirty="0" smtClean="0"/>
-              <a:t>Aumentar o nível 1 e Concluir </a:t>
+              <a:t>nível 1 e Concluir </a:t>
             </a:r>
             <a:r>
               <a:rPr lang="pt-BR" dirty="0" err="1" smtClean="0"/>
@@ -7247,11 +7235,7 @@
             </a:r>
             <a:r>
               <a:rPr lang="pt-BR" dirty="0" smtClean="0"/>
-              <a:t> </a:t>
-            </a:r>
-            <a:r>
-              <a:rPr lang="pt-BR" dirty="0" smtClean="0"/>
-              <a:t>2 </a:t>
+              <a:t> 2 </a:t>
             </a:r>
             <a:r>
               <a:rPr lang="pt-BR" dirty="0" err="1" smtClean="0"/>
@@ -7274,11 +7258,7 @@
             </a:r>
             <a:r>
               <a:rPr lang="pt-BR" dirty="0" smtClean="0"/>
-              <a:t>- </a:t>
-            </a:r>
-            <a:r>
-              <a:rPr lang="pt-BR" dirty="0" smtClean="0"/>
-              <a:t>Animar o Dash	</a:t>
+              <a:t>- Animar o Dash	</a:t>
             </a:r>
           </a:p>
           <a:p>
@@ -7288,11 +7268,11 @@
             </a:r>
             <a:r>
               <a:rPr lang="pt-BR" dirty="0" smtClean="0"/>
-              <a:t>- </a:t>
-            </a:r>
-            <a:r>
-              <a:rPr lang="pt-BR" dirty="0" smtClean="0"/>
-              <a:t>Melhorar a Bomba (e o seu UI)</a:t>
+              <a:t>- Melhorar a Bomba </a:t>
+            </a:r>
+            <a:r>
+              <a:rPr lang="pt-BR" strike="sngStrike" dirty="0" smtClean="0"/>
+              <a:t>(e o seu UI)</a:t>
             </a:r>
           </a:p>
           <a:p>
@@ -7302,13 +7282,16 @@
             </a:r>
             <a:r>
               <a:rPr lang="pt-BR" dirty="0" smtClean="0"/>
-              <a:t>- </a:t>
+              <a:t>- Fazer parede </a:t>
+            </a:r>
+            <a:r>
+              <a:rPr lang="pt-BR" dirty="0" err="1" smtClean="0"/>
+              <a:t>quebravel</a:t>
             </a:r>
             <a:r>
               <a:rPr lang="pt-BR" dirty="0" smtClean="0"/>
-              <a:t>Fazer parede esmagadora (ver como fazer isso de se a colisão for menor que a área do personagem esmagar ele)</a:t>
-            </a:r>
-            <a:endParaRPr lang="pt-BR" dirty="0" smtClean="0"/>
+              <a:t> </a:t>
+            </a:r>
           </a:p>
           <a:p>
             <a:r>
@@ -7317,12 +7300,13 @@
             </a:r>
             <a:r>
               <a:rPr lang="pt-BR" dirty="0" smtClean="0"/>
-              <a:t>- </a:t>
+              <a:t>- Programar a cobra </a:t>
             </a:r>
             <a:r>
               <a:rPr lang="pt-BR" dirty="0" smtClean="0"/>
-              <a:t>Programar a cobra criada</a:t>
-            </a:r>
+              <a:t>criada(rafa já tem a animação)</a:t>
+            </a:r>
+            <a:endParaRPr lang="pt-BR" dirty="0" smtClean="0"/>
           </a:p>
           <a:p>
             <a:r>
@@ -7331,11 +7315,15 @@
             </a:r>
             <a:r>
               <a:rPr lang="pt-BR" dirty="0" smtClean="0"/>
-              <a:t>- </a:t>
+              <a:t>- Mais detalhe no </a:t>
             </a:r>
             <a:r>
               <a:rPr lang="pt-BR" dirty="0" smtClean="0"/>
-              <a:t>Mais detalhe no background do </a:t>
+              <a:t>background(rafa fez nuvens) </a:t>
+            </a:r>
+            <a:r>
+              <a:rPr lang="pt-BR" dirty="0" smtClean="0"/>
+              <a:t>do </a:t>
             </a:r>
             <a:r>
               <a:rPr lang="pt-BR" dirty="0" err="1" smtClean="0"/>
@@ -7343,8 +7331,13 @@
             </a:r>
             <a:r>
               <a:rPr lang="pt-BR" dirty="0" smtClean="0"/>
-              <a:t> menu</a:t>
-            </a:r>
+              <a:t> </a:t>
+            </a:r>
+            <a:r>
+              <a:rPr lang="pt-BR" dirty="0" smtClean="0"/>
+              <a:t>menu(rafa fazendo mapa da fazenda)</a:t>
+            </a:r>
+            <a:endParaRPr lang="pt-BR" dirty="0" smtClean="0"/>
           </a:p>
         </p:txBody>
       </p:sp>

</xml_diff>

<commit_message>
temos uma versao do gameplay do level 1 completo. vamos fazer uma build e postar no itch.io
</commit_message>
<xml_diff>
--- a/Project Data/Ciclo de trabalho.pptx
+++ b/Project Data/Ciclo de trabalho.pptx
@@ -7,6 +7,7 @@
   <p:sldIdLst>
     <p:sldId id="257" r:id="rId2"/>
     <p:sldId id="256" r:id="rId3"/>
+    <p:sldId id="258" r:id="rId4"/>
   </p:sldIdLst>
   <p:sldSz cx="12192000" cy="6858000"/>
   <p:notesSz cx="6858000" cy="9144000"/>
@@ -3416,7 +3417,7 @@
           <a:p>
             <a:fld id="{033C220F-AFE8-4CCC-95E1-E0424241E150}" type="datetimeFigureOut">
               <a:rPr lang="pt-BR" smtClean="0"/>
-              <a:t>06/02/2018</a:t>
+              <a:t>15/02/2018</a:t>
             </a:fld>
             <a:endParaRPr lang="pt-BR"/>
           </a:p>
@@ -3586,7 +3587,7 @@
           <a:p>
             <a:fld id="{033C220F-AFE8-4CCC-95E1-E0424241E150}" type="datetimeFigureOut">
               <a:rPr lang="pt-BR" smtClean="0"/>
-              <a:t>06/02/2018</a:t>
+              <a:t>15/02/2018</a:t>
             </a:fld>
             <a:endParaRPr lang="pt-BR"/>
           </a:p>
@@ -3766,7 +3767,7 @@
           <a:p>
             <a:fld id="{033C220F-AFE8-4CCC-95E1-E0424241E150}" type="datetimeFigureOut">
               <a:rPr lang="pt-BR" smtClean="0"/>
-              <a:t>06/02/2018</a:t>
+              <a:t>15/02/2018</a:t>
             </a:fld>
             <a:endParaRPr lang="pt-BR"/>
           </a:p>
@@ -3936,7 +3937,7 @@
           <a:p>
             <a:fld id="{033C220F-AFE8-4CCC-95E1-E0424241E150}" type="datetimeFigureOut">
               <a:rPr lang="pt-BR" smtClean="0"/>
-              <a:t>06/02/2018</a:t>
+              <a:t>15/02/2018</a:t>
             </a:fld>
             <a:endParaRPr lang="pt-BR"/>
           </a:p>
@@ -4182,7 +4183,7 @@
           <a:p>
             <a:fld id="{033C220F-AFE8-4CCC-95E1-E0424241E150}" type="datetimeFigureOut">
               <a:rPr lang="pt-BR" smtClean="0"/>
-              <a:t>06/02/2018</a:t>
+              <a:t>15/02/2018</a:t>
             </a:fld>
             <a:endParaRPr lang="pt-BR"/>
           </a:p>
@@ -4414,7 +4415,7 @@
           <a:p>
             <a:fld id="{033C220F-AFE8-4CCC-95E1-E0424241E150}" type="datetimeFigureOut">
               <a:rPr lang="pt-BR" smtClean="0"/>
-              <a:t>06/02/2018</a:t>
+              <a:t>15/02/2018</a:t>
             </a:fld>
             <a:endParaRPr lang="pt-BR"/>
           </a:p>
@@ -4781,7 +4782,7 @@
           <a:p>
             <a:fld id="{033C220F-AFE8-4CCC-95E1-E0424241E150}" type="datetimeFigureOut">
               <a:rPr lang="pt-BR" smtClean="0"/>
-              <a:t>06/02/2018</a:t>
+              <a:t>15/02/2018</a:t>
             </a:fld>
             <a:endParaRPr lang="pt-BR"/>
           </a:p>
@@ -4899,7 +4900,7 @@
           <a:p>
             <a:fld id="{033C220F-AFE8-4CCC-95E1-E0424241E150}" type="datetimeFigureOut">
               <a:rPr lang="pt-BR" smtClean="0"/>
-              <a:t>06/02/2018</a:t>
+              <a:t>15/02/2018</a:t>
             </a:fld>
             <a:endParaRPr lang="pt-BR"/>
           </a:p>
@@ -4994,7 +4995,7 @@
           <a:p>
             <a:fld id="{033C220F-AFE8-4CCC-95E1-E0424241E150}" type="datetimeFigureOut">
               <a:rPr lang="pt-BR" smtClean="0"/>
-              <a:t>06/02/2018</a:t>
+              <a:t>15/02/2018</a:t>
             </a:fld>
             <a:endParaRPr lang="pt-BR"/>
           </a:p>
@@ -5271,7 +5272,7 @@
           <a:p>
             <a:fld id="{033C220F-AFE8-4CCC-95E1-E0424241E150}" type="datetimeFigureOut">
               <a:rPr lang="pt-BR" smtClean="0"/>
-              <a:t>06/02/2018</a:t>
+              <a:t>15/02/2018</a:t>
             </a:fld>
             <a:endParaRPr lang="pt-BR"/>
           </a:p>
@@ -5524,7 +5525,7 @@
           <a:p>
             <a:fld id="{033C220F-AFE8-4CCC-95E1-E0424241E150}" type="datetimeFigureOut">
               <a:rPr lang="pt-BR" smtClean="0"/>
-              <a:t>06/02/2018</a:t>
+              <a:t>15/02/2018</a:t>
             </a:fld>
             <a:endParaRPr lang="pt-BR"/>
           </a:p>
@@ -5737,7 +5738,7 @@
           <a:p>
             <a:fld id="{033C220F-AFE8-4CCC-95E1-E0424241E150}" type="datetimeFigureOut">
               <a:rPr lang="pt-BR" smtClean="0"/>
-              <a:t>06/02/2018</a:t>
+              <a:t>15/02/2018</a:t>
             </a:fld>
             <a:endParaRPr lang="pt-BR"/>
           </a:p>
@@ -7223,11 +7224,7 @@
           <a:p>
             <a:r>
               <a:rPr lang="pt-BR" dirty="0" smtClean="0"/>
-              <a:t>	- Aumentar o </a:t>
-            </a:r>
-            <a:r>
-              <a:rPr lang="pt-BR" dirty="0" smtClean="0"/>
-              <a:t>nível 1 e Concluir </a:t>
+              <a:t>	- Aumentar o nível 1 e Concluir </a:t>
             </a:r>
             <a:r>
               <a:rPr lang="pt-BR" dirty="0" err="1" smtClean="0"/>
@@ -7300,13 +7297,8 @@
             </a:r>
             <a:r>
               <a:rPr lang="pt-BR" dirty="0" smtClean="0"/>
-              <a:t>- Programar a cobra </a:t>
-            </a:r>
-            <a:r>
-              <a:rPr lang="pt-BR" dirty="0" smtClean="0"/>
-              <a:t>criada(rafa já tem a animação)</a:t>
-            </a:r>
-            <a:endParaRPr lang="pt-BR" dirty="0" smtClean="0"/>
+              <a:t>- Programar a cobra criada(rafa já tem a animação)</a:t>
+            </a:r>
           </a:p>
           <a:p>
             <a:r>
@@ -7315,15 +7307,7 @@
             </a:r>
             <a:r>
               <a:rPr lang="pt-BR" dirty="0" smtClean="0"/>
-              <a:t>- Mais detalhe no </a:t>
-            </a:r>
-            <a:r>
-              <a:rPr lang="pt-BR" dirty="0" smtClean="0"/>
-              <a:t>background(rafa fez nuvens) </a:t>
-            </a:r>
-            <a:r>
-              <a:rPr lang="pt-BR" dirty="0" smtClean="0"/>
-              <a:t>do </a:t>
+              <a:t>- Mais detalhe no background(rafa fez nuvens) do </a:t>
             </a:r>
             <a:r>
               <a:rPr lang="pt-BR" dirty="0" err="1" smtClean="0"/>
@@ -7331,13 +7315,8 @@
             </a:r>
             <a:r>
               <a:rPr lang="pt-BR" dirty="0" smtClean="0"/>
-              <a:t> </a:t>
-            </a:r>
-            <a:r>
-              <a:rPr lang="pt-BR" dirty="0" smtClean="0"/>
-              <a:t>menu(rafa fazendo mapa da fazenda)</a:t>
-            </a:r>
-            <a:endParaRPr lang="pt-BR" dirty="0" smtClean="0"/>
+              <a:t> menu(rafa fazendo mapa da fazenda)</a:t>
+            </a:r>
           </a:p>
         </p:txBody>
       </p:sp>
@@ -9428,6 +9407,962 @@
 </p:sld>
 </file>
 
+<file path=ppt/slides/slide3.xml><?xml version="1.0" encoding="utf-8"?>
+<p:sld xmlns:a="http://schemas.openxmlformats.org/drawingml/2006/main" xmlns:r="http://schemas.openxmlformats.org/officeDocument/2006/relationships" xmlns:p="http://schemas.openxmlformats.org/presentationml/2006/main">
+  <p:cSld>
+    <p:spTree>
+      <p:nvGrpSpPr>
+        <p:cNvPr id="1" name=""/>
+        <p:cNvGrpSpPr/>
+        <p:nvPr/>
+      </p:nvGrpSpPr>
+      <p:grpSpPr>
+        <a:xfrm>
+          <a:off x="0" y="0"/>
+          <a:ext cx="0" cy="0"/>
+          <a:chOff x="0" y="0"/>
+          <a:chExt cx="0" cy="0"/>
+        </a:xfrm>
+      </p:grpSpPr>
+      <p:sp>
+        <p:nvSpPr>
+          <p:cNvPr id="2" name="Título 1"/>
+          <p:cNvSpPr>
+            <a:spLocks noGrp="1"/>
+          </p:cNvSpPr>
+          <p:nvPr>
+            <p:ph type="title"/>
+          </p:nvPr>
+        </p:nvSpPr>
+        <p:spPr/>
+        <p:txBody>
+          <a:bodyPr/>
+          <a:lstStyle/>
+          <a:p>
+            <a:r>
+              <a:rPr lang="en-US" dirty="0" err="1" smtClean="0"/>
+              <a:t>Roteiro</a:t>
+            </a:r>
+            <a:r>
+              <a:rPr lang="en-US" dirty="0" smtClean="0"/>
+              <a:t> de </a:t>
+            </a:r>
+            <a:r>
+              <a:rPr lang="en-US" dirty="0" err="1" smtClean="0"/>
+              <a:t>habilidade</a:t>
+            </a:r>
+            <a:r>
+              <a:rPr lang="en-US" dirty="0" smtClean="0"/>
+              <a:t> e </a:t>
+            </a:r>
+            <a:r>
+              <a:rPr lang="en-US" dirty="0" err="1" smtClean="0"/>
+              <a:t>fases</a:t>
+            </a:r>
+            <a:r>
+              <a:rPr lang="en-US" dirty="0" smtClean="0"/>
+              <a:t>	</a:t>
+            </a:r>
+            <a:endParaRPr lang="pt-BR" dirty="0"/>
+          </a:p>
+        </p:txBody>
+      </p:sp>
+      <p:sp>
+        <p:nvSpPr>
+          <p:cNvPr id="3" name="Espaço Reservado para Conteúdo 2"/>
+          <p:cNvSpPr>
+            <a:spLocks noGrp="1"/>
+          </p:cNvSpPr>
+          <p:nvPr>
+            <p:ph idx="1"/>
+          </p:nvPr>
+        </p:nvSpPr>
+        <p:spPr/>
+        <p:txBody>
+          <a:bodyPr>
+            <a:normAutofit fontScale="55000" lnSpcReduction="20000"/>
+          </a:bodyPr>
+          <a:lstStyle/>
+          <a:p>
+            <a:r>
+              <a:rPr lang="en-US" dirty="0" err="1" smtClean="0"/>
+              <a:t>Começa</a:t>
+            </a:r>
+            <a:r>
+              <a:rPr lang="en-US" dirty="0" smtClean="0"/>
+              <a:t> com o </a:t>
+            </a:r>
+            <a:r>
+              <a:rPr lang="en-US" dirty="0" err="1" smtClean="0"/>
+              <a:t>menino</a:t>
+            </a:r>
+            <a:r>
+              <a:rPr lang="en-US" dirty="0" smtClean="0"/>
+              <a:t> </a:t>
+            </a:r>
+            <a:r>
+              <a:rPr lang="en-US" dirty="0" err="1" smtClean="0"/>
+              <a:t>ensinando</a:t>
+            </a:r>
+            <a:r>
+              <a:rPr lang="en-US" dirty="0" smtClean="0"/>
+              <a:t> a </a:t>
+            </a:r>
+            <a:r>
+              <a:rPr lang="en-US" dirty="0" err="1" smtClean="0"/>
+              <a:t>correr</a:t>
+            </a:r>
+            <a:r>
+              <a:rPr lang="en-US" dirty="0" smtClean="0"/>
+              <a:t>.</a:t>
+            </a:r>
+          </a:p>
+          <a:p>
+            <a:r>
+              <a:rPr lang="en-US" dirty="0" err="1" smtClean="0"/>
+              <a:t>Fim</a:t>
+            </a:r>
+            <a:r>
+              <a:rPr lang="en-US" dirty="0" smtClean="0"/>
+              <a:t> da </a:t>
+            </a:r>
+            <a:r>
+              <a:rPr lang="en-US" dirty="0" err="1" smtClean="0"/>
+              <a:t>primeira</a:t>
+            </a:r>
+            <a:r>
+              <a:rPr lang="en-US" dirty="0" smtClean="0"/>
+              <a:t> </a:t>
+            </a:r>
+            <a:r>
+              <a:rPr lang="en-US" dirty="0" err="1" smtClean="0"/>
+              <a:t>fase</a:t>
+            </a:r>
+            <a:r>
+              <a:rPr lang="en-US" dirty="0" smtClean="0"/>
+              <a:t> a </a:t>
+            </a:r>
+            <a:r>
+              <a:rPr lang="en-US" dirty="0" err="1" smtClean="0"/>
+              <a:t>bomba</a:t>
+            </a:r>
+            <a:r>
+              <a:rPr lang="en-US" dirty="0" smtClean="0"/>
+              <a:t> é </a:t>
+            </a:r>
+            <a:r>
+              <a:rPr lang="en-US" dirty="0" err="1" smtClean="0"/>
+              <a:t>apresentada</a:t>
+            </a:r>
+            <a:endParaRPr lang="en-US" dirty="0" smtClean="0"/>
+          </a:p>
+          <a:p>
+            <a:r>
+              <a:rPr lang="en-US" dirty="0" smtClean="0"/>
+              <a:t>2ª </a:t>
+            </a:r>
+            <a:r>
+              <a:rPr lang="en-US" dirty="0" err="1" smtClean="0"/>
+              <a:t>fase</a:t>
+            </a:r>
+            <a:r>
+              <a:rPr lang="en-US" dirty="0" smtClean="0"/>
+              <a:t> </a:t>
+            </a:r>
+            <a:r>
+              <a:rPr lang="en-US" dirty="0" err="1" smtClean="0"/>
+              <a:t>toda</a:t>
+            </a:r>
+            <a:r>
+              <a:rPr lang="en-US" dirty="0" smtClean="0"/>
+              <a:t> </a:t>
+            </a:r>
+            <a:r>
+              <a:rPr lang="en-US" dirty="0" err="1" smtClean="0"/>
+              <a:t>sobre</a:t>
+            </a:r>
+            <a:r>
+              <a:rPr lang="en-US" dirty="0" smtClean="0"/>
+              <a:t> </a:t>
+            </a:r>
+            <a:r>
+              <a:rPr lang="en-US" dirty="0" err="1" smtClean="0"/>
+              <a:t>bombas</a:t>
+            </a:r>
+            <a:r>
+              <a:rPr lang="en-US" dirty="0" smtClean="0"/>
+              <a:t> e </a:t>
+            </a:r>
+            <a:r>
+              <a:rPr lang="en-US" dirty="0" err="1" smtClean="0"/>
+              <a:t>pulos</a:t>
+            </a:r>
+            <a:r>
+              <a:rPr lang="en-US" dirty="0" smtClean="0"/>
+              <a:t> </a:t>
+            </a:r>
+            <a:r>
+              <a:rPr lang="en-US" dirty="0" err="1" smtClean="0"/>
+              <a:t>na</a:t>
+            </a:r>
+            <a:r>
+              <a:rPr lang="en-US" dirty="0" smtClean="0"/>
+              <a:t> </a:t>
+            </a:r>
+            <a:r>
+              <a:rPr lang="en-US" dirty="0" err="1" smtClean="0"/>
+              <a:t>parede</a:t>
+            </a:r>
+            <a:r>
+              <a:rPr lang="en-US" dirty="0" smtClean="0"/>
+              <a:t> (e cobras)</a:t>
+            </a:r>
+          </a:p>
+          <a:p>
+            <a:r>
+              <a:rPr lang="en-US" dirty="0" smtClean="0"/>
+              <a:t>3 </a:t>
+            </a:r>
+            <a:r>
+              <a:rPr lang="en-US" dirty="0" err="1" smtClean="0"/>
+              <a:t>fase</a:t>
+            </a:r>
+            <a:r>
+              <a:rPr lang="en-US" dirty="0" smtClean="0"/>
+              <a:t> um boss</a:t>
+            </a:r>
+          </a:p>
+          <a:p>
+            <a:r>
+              <a:rPr lang="en-US" dirty="0" err="1" smtClean="0"/>
+              <a:t>Transição</a:t>
+            </a:r>
+            <a:r>
+              <a:rPr lang="en-US" dirty="0" smtClean="0"/>
+              <a:t> </a:t>
+            </a:r>
+            <a:r>
+              <a:rPr lang="en-US" dirty="0" err="1" smtClean="0"/>
+              <a:t>onde</a:t>
+            </a:r>
+            <a:r>
+              <a:rPr lang="en-US" dirty="0" smtClean="0"/>
+              <a:t> o </a:t>
+            </a:r>
+            <a:r>
+              <a:rPr lang="en-US" dirty="0" err="1" smtClean="0"/>
+              <a:t>menino</a:t>
+            </a:r>
+            <a:r>
+              <a:rPr lang="en-US" dirty="0" smtClean="0"/>
+              <a:t> </a:t>
+            </a:r>
+            <a:r>
+              <a:rPr lang="en-US" dirty="0" err="1" smtClean="0"/>
+              <a:t>mostra</a:t>
+            </a:r>
+            <a:r>
+              <a:rPr lang="en-US" dirty="0" smtClean="0"/>
+              <a:t> o </a:t>
+            </a:r>
+            <a:r>
+              <a:rPr lang="en-US" dirty="0" err="1" smtClean="0"/>
+              <a:t>aviao</a:t>
+            </a:r>
+            <a:r>
+              <a:rPr lang="en-US" dirty="0" smtClean="0"/>
+              <a:t>  no </a:t>
+            </a:r>
+            <a:r>
+              <a:rPr lang="en-US" dirty="0" err="1" smtClean="0"/>
+              <a:t>celeiro</a:t>
+            </a:r>
+            <a:r>
+              <a:rPr lang="en-US" dirty="0" smtClean="0"/>
+              <a:t> e da o </a:t>
+            </a:r>
+            <a:r>
+              <a:rPr lang="en-US" dirty="0" err="1" smtClean="0"/>
+              <a:t>cachecol</a:t>
+            </a:r>
+            <a:r>
+              <a:rPr lang="en-US" dirty="0" smtClean="0"/>
+              <a:t> pro mm</a:t>
+            </a:r>
+          </a:p>
+          <a:p>
+            <a:r>
+              <a:rPr lang="en-US" dirty="0" err="1" smtClean="0"/>
+              <a:t>Fase</a:t>
+            </a:r>
+            <a:r>
+              <a:rPr lang="en-US" dirty="0" smtClean="0"/>
+              <a:t> de </a:t>
+            </a:r>
+            <a:r>
+              <a:rPr lang="en-US" dirty="0" err="1" smtClean="0"/>
+              <a:t>tiro</a:t>
+            </a:r>
+            <a:r>
+              <a:rPr lang="en-US" dirty="0" smtClean="0"/>
+              <a:t> no </a:t>
+            </a:r>
+            <a:r>
+              <a:rPr lang="en-US" dirty="0" err="1" smtClean="0"/>
+              <a:t>ceu</a:t>
+            </a:r>
+            <a:endParaRPr lang="en-US" dirty="0" smtClean="0"/>
+          </a:p>
+          <a:p>
+            <a:r>
+              <a:rPr lang="en-US" dirty="0" smtClean="0"/>
+              <a:t>2 </a:t>
+            </a:r>
+            <a:r>
+              <a:rPr lang="en-US" dirty="0" err="1" smtClean="0"/>
+              <a:t>fase</a:t>
+            </a:r>
+            <a:r>
+              <a:rPr lang="en-US" dirty="0" smtClean="0"/>
+              <a:t> de </a:t>
+            </a:r>
+            <a:r>
+              <a:rPr lang="en-US" dirty="0" err="1" smtClean="0"/>
+              <a:t>tiro</a:t>
+            </a:r>
+            <a:r>
+              <a:rPr lang="en-US" dirty="0" smtClean="0"/>
+              <a:t> no </a:t>
+            </a:r>
+            <a:r>
+              <a:rPr lang="en-US" dirty="0" err="1" smtClean="0"/>
+              <a:t>ceu</a:t>
+            </a:r>
+            <a:r>
+              <a:rPr lang="en-US" dirty="0" smtClean="0"/>
+              <a:t> e </a:t>
+            </a:r>
+            <a:r>
+              <a:rPr lang="en-US" dirty="0" err="1" smtClean="0"/>
+              <a:t>termina</a:t>
+            </a:r>
+            <a:r>
+              <a:rPr lang="en-US" dirty="0" smtClean="0"/>
+              <a:t> com a </a:t>
+            </a:r>
+            <a:r>
+              <a:rPr lang="en-US" dirty="0" err="1" smtClean="0"/>
+              <a:t>aleafar</a:t>
+            </a:r>
+            <a:r>
+              <a:rPr lang="en-US" dirty="0" smtClean="0"/>
+              <a:t> </a:t>
+            </a:r>
+            <a:r>
+              <a:rPr lang="en-US" dirty="0" err="1" smtClean="0"/>
+              <a:t>derrubando</a:t>
+            </a:r>
+            <a:r>
+              <a:rPr lang="en-US" dirty="0" smtClean="0"/>
+              <a:t> o MM</a:t>
+            </a:r>
+          </a:p>
+          <a:p>
+            <a:r>
+              <a:rPr lang="en-US" dirty="0" smtClean="0"/>
+              <a:t>1 </a:t>
+            </a:r>
+            <a:r>
+              <a:rPr lang="en-US" dirty="0" err="1" smtClean="0"/>
+              <a:t>fase</a:t>
+            </a:r>
+            <a:r>
+              <a:rPr lang="en-US" dirty="0" smtClean="0"/>
+              <a:t> da </a:t>
+            </a:r>
+            <a:r>
+              <a:rPr lang="en-US" dirty="0" err="1" smtClean="0"/>
+              <a:t>floresta</a:t>
+            </a:r>
+            <a:r>
+              <a:rPr lang="en-US" dirty="0" smtClean="0"/>
+              <a:t> com o </a:t>
+            </a:r>
+            <a:r>
+              <a:rPr lang="en-US" dirty="0" err="1" smtClean="0"/>
+              <a:t>cachecol</a:t>
+            </a:r>
+            <a:r>
+              <a:rPr lang="en-US" dirty="0" smtClean="0"/>
+              <a:t> </a:t>
+            </a:r>
+            <a:r>
+              <a:rPr lang="en-US" dirty="0" err="1" smtClean="0"/>
+              <a:t>rasgado</a:t>
+            </a:r>
+            <a:r>
+              <a:rPr lang="en-US" dirty="0" smtClean="0"/>
+              <a:t> , que agora é </a:t>
+            </a:r>
+            <a:r>
+              <a:rPr lang="en-US" dirty="0" err="1" smtClean="0"/>
+              <a:t>uma</a:t>
+            </a:r>
+            <a:r>
+              <a:rPr lang="en-US" dirty="0" smtClean="0"/>
+              <a:t> </a:t>
+            </a:r>
+            <a:r>
+              <a:rPr lang="en-US" dirty="0" err="1" smtClean="0"/>
+              <a:t>caa</a:t>
+            </a:r>
+            <a:r>
+              <a:rPr lang="en-US" dirty="0" smtClean="0"/>
+              <a:t> </a:t>
+            </a:r>
+            <a:r>
+              <a:rPr lang="en-US" dirty="0" err="1" smtClean="0"/>
+              <a:t>ele</a:t>
+            </a:r>
+            <a:r>
+              <a:rPr lang="en-US" dirty="0" smtClean="0"/>
+              <a:t> </a:t>
+            </a:r>
+            <a:r>
+              <a:rPr lang="en-US" dirty="0" err="1" smtClean="0"/>
+              <a:t>ganha</a:t>
+            </a:r>
+            <a:r>
+              <a:rPr lang="en-US" dirty="0" smtClean="0"/>
+              <a:t> o dash</a:t>
+            </a:r>
+          </a:p>
+          <a:p>
+            <a:r>
+              <a:rPr lang="en-US" dirty="0" smtClean="0"/>
+              <a:t>2 </a:t>
+            </a:r>
+            <a:r>
+              <a:rPr lang="en-US" dirty="0" err="1" smtClean="0"/>
+              <a:t>fase</a:t>
+            </a:r>
+            <a:r>
+              <a:rPr lang="en-US" dirty="0" smtClean="0"/>
+              <a:t> da </a:t>
+            </a:r>
+            <a:r>
+              <a:rPr lang="en-US" dirty="0" err="1" smtClean="0"/>
+              <a:t>floresta</a:t>
+            </a:r>
+            <a:r>
+              <a:rPr lang="en-US" dirty="0" smtClean="0"/>
+              <a:t> </a:t>
+            </a:r>
+            <a:r>
+              <a:rPr lang="en-US" dirty="0" err="1" smtClean="0"/>
+              <a:t>explora</a:t>
+            </a:r>
+            <a:r>
+              <a:rPr lang="en-US" dirty="0" smtClean="0"/>
+              <a:t> a </a:t>
+            </a:r>
+            <a:r>
+              <a:rPr lang="en-US" dirty="0" err="1" smtClean="0"/>
+              <a:t>habilidade</a:t>
+            </a:r>
+            <a:r>
+              <a:rPr lang="en-US" dirty="0" smtClean="0"/>
+              <a:t> de dash e </a:t>
+            </a:r>
+            <a:r>
+              <a:rPr lang="en-US" dirty="0" err="1" smtClean="0"/>
+              <a:t>pulo</a:t>
+            </a:r>
+            <a:r>
+              <a:rPr lang="en-US" dirty="0" smtClean="0"/>
+              <a:t> </a:t>
+            </a:r>
+            <a:r>
+              <a:rPr lang="en-US" dirty="0" err="1" smtClean="0"/>
+              <a:t>na</a:t>
+            </a:r>
+            <a:r>
+              <a:rPr lang="en-US" dirty="0" smtClean="0"/>
+              <a:t> </a:t>
+            </a:r>
+            <a:r>
+              <a:rPr lang="en-US" dirty="0" err="1" smtClean="0"/>
+              <a:t>parede</a:t>
+            </a:r>
+            <a:r>
+              <a:rPr lang="en-US" dirty="0" smtClean="0"/>
+              <a:t> </a:t>
+            </a:r>
+            <a:r>
+              <a:rPr lang="en-US" dirty="0" err="1" smtClean="0"/>
+              <a:t>escorregando</a:t>
+            </a:r>
+            <a:r>
+              <a:rPr lang="en-US" dirty="0" smtClean="0"/>
+              <a:t>.</a:t>
+            </a:r>
+          </a:p>
+          <a:p>
+            <a:r>
+              <a:rPr lang="en-US" dirty="0" err="1" smtClean="0"/>
+              <a:t>Miniboss</a:t>
+            </a:r>
+            <a:r>
+              <a:rPr lang="en-US" dirty="0" smtClean="0"/>
+              <a:t> (</a:t>
+            </a:r>
+            <a:r>
+              <a:rPr lang="en-US" dirty="0" err="1" smtClean="0"/>
+              <a:t>pode</a:t>
+            </a:r>
+            <a:r>
+              <a:rPr lang="en-US" dirty="0" smtClean="0"/>
+              <a:t> </a:t>
+            </a:r>
+            <a:r>
+              <a:rPr lang="en-US" dirty="0" err="1" smtClean="0"/>
+              <a:t>ser</a:t>
+            </a:r>
+            <a:r>
+              <a:rPr lang="en-US" dirty="0" smtClean="0"/>
+              <a:t> um </a:t>
+            </a:r>
+            <a:r>
+              <a:rPr lang="en-US" dirty="0" err="1" smtClean="0"/>
+              <a:t>cao</a:t>
+            </a:r>
+            <a:r>
+              <a:rPr lang="en-US" dirty="0" smtClean="0"/>
+              <a:t> de </a:t>
+            </a:r>
+            <a:r>
+              <a:rPr lang="en-US" dirty="0" err="1" smtClean="0"/>
+              <a:t>guarda</a:t>
+            </a:r>
+            <a:r>
+              <a:rPr lang="en-US" dirty="0"/>
+              <a:t> </a:t>
+            </a:r>
+            <a:r>
+              <a:rPr lang="en-US" dirty="0" smtClean="0"/>
+              <a:t>do </a:t>
+            </a:r>
+            <a:r>
+              <a:rPr lang="en-US" dirty="0" err="1" smtClean="0"/>
+              <a:t>Laboratorio</a:t>
+            </a:r>
+            <a:r>
+              <a:rPr lang="en-US" dirty="0" smtClean="0"/>
+              <a:t>)</a:t>
+            </a:r>
+          </a:p>
+          <a:p>
+            <a:r>
+              <a:rPr lang="en-US" dirty="0" smtClean="0"/>
+              <a:t>1 </a:t>
+            </a:r>
+            <a:r>
+              <a:rPr lang="en-US" dirty="0" err="1" smtClean="0"/>
+              <a:t>fase</a:t>
+            </a:r>
+            <a:r>
+              <a:rPr lang="en-US" dirty="0" smtClean="0"/>
+              <a:t> do </a:t>
+            </a:r>
+            <a:r>
+              <a:rPr lang="en-US" dirty="0" err="1" smtClean="0"/>
+              <a:t>laboratorio</a:t>
+            </a:r>
+            <a:r>
+              <a:rPr lang="en-US" dirty="0" smtClean="0"/>
+              <a:t> (</a:t>
+            </a:r>
+            <a:r>
+              <a:rPr lang="en-US" dirty="0" err="1" smtClean="0"/>
+              <a:t>começa</a:t>
+            </a:r>
+            <a:r>
+              <a:rPr lang="en-US" dirty="0" smtClean="0"/>
+              <a:t> a </a:t>
+            </a:r>
+            <a:r>
+              <a:rPr lang="en-US" dirty="0" err="1" smtClean="0"/>
+              <a:t>explorar</a:t>
+            </a:r>
+            <a:r>
+              <a:rPr lang="en-US" dirty="0" smtClean="0"/>
+              <a:t> </a:t>
+            </a:r>
+            <a:r>
+              <a:rPr lang="en-US" dirty="0" err="1" smtClean="0"/>
+              <a:t>os</a:t>
+            </a:r>
+            <a:r>
+              <a:rPr lang="en-US" dirty="0" smtClean="0"/>
+              <a:t> </a:t>
+            </a:r>
+            <a:r>
+              <a:rPr lang="en-US" dirty="0" err="1" smtClean="0"/>
+              <a:t>raios</a:t>
+            </a:r>
+            <a:r>
+              <a:rPr lang="en-US" dirty="0" smtClean="0"/>
+              <a:t>)</a:t>
+            </a:r>
+          </a:p>
+          <a:p>
+            <a:r>
+              <a:rPr lang="en-US" dirty="0" smtClean="0"/>
+              <a:t>2 </a:t>
+            </a:r>
+            <a:r>
+              <a:rPr lang="en-US" dirty="0" err="1" smtClean="0"/>
+              <a:t>fase</a:t>
+            </a:r>
+            <a:r>
+              <a:rPr lang="en-US" dirty="0" smtClean="0"/>
+              <a:t> do </a:t>
+            </a:r>
+            <a:r>
+              <a:rPr lang="en-US" dirty="0" err="1" smtClean="0"/>
+              <a:t>laboratorio</a:t>
+            </a:r>
+            <a:r>
+              <a:rPr lang="en-US" dirty="0" smtClean="0"/>
+              <a:t> </a:t>
+            </a:r>
+            <a:r>
+              <a:rPr lang="en-US" dirty="0" err="1" smtClean="0"/>
+              <a:t>adiciona</a:t>
+            </a:r>
+            <a:r>
+              <a:rPr lang="en-US" dirty="0" smtClean="0"/>
+              <a:t> </a:t>
+            </a:r>
+            <a:r>
+              <a:rPr lang="en-US" dirty="0" err="1" smtClean="0"/>
+              <a:t>algum</a:t>
+            </a:r>
+            <a:r>
+              <a:rPr lang="en-US" dirty="0" smtClean="0"/>
+              <a:t> </a:t>
+            </a:r>
+            <a:r>
+              <a:rPr lang="en-US" dirty="0" err="1" smtClean="0"/>
+              <a:t>inimigo</a:t>
+            </a:r>
+            <a:r>
+              <a:rPr lang="en-US" dirty="0" smtClean="0"/>
+              <a:t> que </a:t>
+            </a:r>
+            <a:r>
+              <a:rPr lang="en-US" dirty="0" err="1" smtClean="0"/>
+              <a:t>taca</a:t>
+            </a:r>
+            <a:r>
+              <a:rPr lang="en-US" dirty="0" smtClean="0"/>
+              <a:t> </a:t>
+            </a:r>
+            <a:r>
+              <a:rPr lang="en-US" dirty="0" err="1" smtClean="0"/>
+              <a:t>coisas</a:t>
+            </a:r>
+            <a:r>
+              <a:rPr lang="en-US" dirty="0" smtClean="0"/>
+              <a:t> </a:t>
+            </a:r>
+            <a:r>
+              <a:rPr lang="en-US" dirty="0" err="1" smtClean="0"/>
+              <a:t>como</a:t>
+            </a:r>
+            <a:r>
+              <a:rPr lang="en-US" dirty="0" smtClean="0"/>
+              <a:t> </a:t>
+            </a:r>
+            <a:r>
+              <a:rPr lang="en-US" dirty="0" err="1" smtClean="0"/>
+              <a:t>frascos</a:t>
+            </a:r>
+            <a:r>
+              <a:rPr lang="en-US" dirty="0" smtClean="0"/>
+              <a:t> de </a:t>
+            </a:r>
+            <a:r>
+              <a:rPr lang="en-US" dirty="0" err="1" smtClean="0"/>
+              <a:t>veneno</a:t>
+            </a:r>
+            <a:r>
+              <a:rPr lang="en-US" dirty="0" smtClean="0"/>
+              <a:t> (</a:t>
+            </a:r>
+            <a:r>
+              <a:rPr lang="en-US" dirty="0" err="1" smtClean="0"/>
+              <a:t>macaco</a:t>
+            </a:r>
+            <a:r>
+              <a:rPr lang="en-US" dirty="0" smtClean="0"/>
+              <a:t>).</a:t>
+            </a:r>
+          </a:p>
+          <a:p>
+            <a:r>
+              <a:rPr lang="en-US" dirty="0" smtClean="0"/>
+              <a:t>3 </a:t>
+            </a:r>
+            <a:r>
+              <a:rPr lang="en-US" dirty="0" err="1" smtClean="0"/>
+              <a:t>fase</a:t>
+            </a:r>
+            <a:r>
+              <a:rPr lang="en-US" dirty="0" smtClean="0"/>
+              <a:t> mm no </a:t>
+            </a:r>
+            <a:r>
+              <a:rPr lang="en-US" dirty="0" err="1" smtClean="0"/>
+              <a:t>fim</a:t>
+            </a:r>
+            <a:r>
+              <a:rPr lang="en-US" dirty="0" smtClean="0"/>
+              <a:t> mm </a:t>
+            </a:r>
+            <a:r>
+              <a:rPr lang="en-US" dirty="0" err="1" smtClean="0"/>
+              <a:t>chega</a:t>
+            </a:r>
+            <a:r>
+              <a:rPr lang="en-US" dirty="0" smtClean="0"/>
+              <a:t> </a:t>
+            </a:r>
+            <a:r>
+              <a:rPr lang="en-US" dirty="0" err="1" smtClean="0"/>
+              <a:t>na</a:t>
+            </a:r>
+            <a:r>
+              <a:rPr lang="en-US" dirty="0" smtClean="0"/>
+              <a:t> </a:t>
+            </a:r>
+            <a:r>
+              <a:rPr lang="en-US" dirty="0" err="1" smtClean="0"/>
+              <a:t>sala</a:t>
+            </a:r>
+            <a:r>
+              <a:rPr lang="en-US" dirty="0" smtClean="0"/>
+              <a:t> da </a:t>
+            </a:r>
+            <a:r>
+              <a:rPr lang="en-US" dirty="0" err="1" smtClean="0"/>
+              <a:t>aleafar</a:t>
+            </a:r>
+            <a:r>
+              <a:rPr lang="en-US" dirty="0" smtClean="0"/>
+              <a:t>. Ela </a:t>
+            </a:r>
+            <a:r>
+              <a:rPr lang="en-US" dirty="0" err="1" smtClean="0"/>
+              <a:t>fala</a:t>
+            </a:r>
+            <a:r>
+              <a:rPr lang="en-US" dirty="0" smtClean="0"/>
+              <a:t> que </a:t>
+            </a:r>
+            <a:r>
+              <a:rPr lang="en-US" dirty="0" err="1" smtClean="0"/>
+              <a:t>ele</a:t>
+            </a:r>
+            <a:r>
+              <a:rPr lang="en-US" dirty="0" smtClean="0"/>
+              <a:t> é o </a:t>
+            </a:r>
+            <a:r>
+              <a:rPr lang="en-US" dirty="0" err="1" smtClean="0"/>
+              <a:t>unico</a:t>
+            </a:r>
+            <a:r>
+              <a:rPr lang="en-US" dirty="0" smtClean="0"/>
+              <a:t> experiment </a:t>
+            </a:r>
+            <a:r>
+              <a:rPr lang="en-US" dirty="0" err="1" smtClean="0"/>
+              <a:t>bem</a:t>
+            </a:r>
+            <a:r>
+              <a:rPr lang="en-US" dirty="0" smtClean="0"/>
+              <a:t> </a:t>
+            </a:r>
+            <a:r>
+              <a:rPr lang="en-US" dirty="0" err="1" smtClean="0"/>
+              <a:t>sucedido</a:t>
+            </a:r>
+            <a:r>
+              <a:rPr lang="en-US" dirty="0" smtClean="0"/>
+              <a:t> que </a:t>
+            </a:r>
+            <a:r>
+              <a:rPr lang="en-US" dirty="0" err="1" smtClean="0"/>
+              <a:t>ela</a:t>
+            </a:r>
+            <a:r>
+              <a:rPr lang="en-US" dirty="0" smtClean="0"/>
+              <a:t> </a:t>
+            </a:r>
+            <a:r>
+              <a:rPr lang="en-US" dirty="0" err="1" smtClean="0"/>
+              <a:t>teve</a:t>
+            </a:r>
+            <a:r>
+              <a:rPr lang="en-US" dirty="0" smtClean="0"/>
+              <a:t>, e o </a:t>
+            </a:r>
+            <a:r>
+              <a:rPr lang="en-US" dirty="0" err="1" smtClean="0"/>
+              <a:t>convida</a:t>
+            </a:r>
+            <a:r>
+              <a:rPr lang="en-US" dirty="0" smtClean="0"/>
+              <a:t> </a:t>
+            </a:r>
+            <a:r>
+              <a:rPr lang="en-US" dirty="0" err="1" smtClean="0"/>
+              <a:t>pra</a:t>
+            </a:r>
+            <a:r>
+              <a:rPr lang="en-US" dirty="0" smtClean="0"/>
+              <a:t> </a:t>
+            </a:r>
+            <a:r>
+              <a:rPr lang="en-US" dirty="0" err="1" smtClean="0"/>
+              <a:t>ser</a:t>
+            </a:r>
+            <a:r>
+              <a:rPr lang="en-US" dirty="0" smtClean="0"/>
+              <a:t> </a:t>
+            </a:r>
+            <a:r>
+              <a:rPr lang="en-US" dirty="0" err="1" smtClean="0"/>
+              <a:t>seu</a:t>
+            </a:r>
+            <a:r>
+              <a:rPr lang="en-US" dirty="0" smtClean="0"/>
+              <a:t> </a:t>
+            </a:r>
+            <a:r>
+              <a:rPr lang="en-US" dirty="0" err="1" smtClean="0"/>
+              <a:t>braço</a:t>
+            </a:r>
+            <a:r>
+              <a:rPr lang="en-US" dirty="0" smtClean="0"/>
+              <a:t> </a:t>
+            </a:r>
+            <a:r>
+              <a:rPr lang="en-US" dirty="0" err="1" smtClean="0"/>
+              <a:t>direito</a:t>
+            </a:r>
+            <a:r>
+              <a:rPr lang="en-US" dirty="0"/>
+              <a:t> </a:t>
+            </a:r>
+            <a:r>
+              <a:rPr lang="en-US" dirty="0" err="1" smtClean="0"/>
+              <a:t>na</a:t>
+            </a:r>
+            <a:r>
+              <a:rPr lang="en-US" dirty="0" smtClean="0"/>
+              <a:t> </a:t>
+            </a:r>
+            <a:r>
+              <a:rPr lang="en-US" dirty="0" err="1" smtClean="0"/>
+              <a:t>criação</a:t>
+            </a:r>
+            <a:r>
+              <a:rPr lang="en-US" dirty="0" smtClean="0"/>
+              <a:t> de um </a:t>
+            </a:r>
+            <a:r>
+              <a:rPr lang="en-US" dirty="0" err="1" smtClean="0"/>
+              <a:t>mundo</a:t>
+            </a:r>
+            <a:r>
+              <a:rPr lang="en-US" dirty="0" smtClean="0"/>
+              <a:t> </a:t>
+            </a:r>
+            <a:r>
+              <a:rPr lang="en-US" dirty="0" err="1" smtClean="0"/>
+              <a:t>sem</a:t>
+            </a:r>
+            <a:r>
+              <a:rPr lang="en-US" dirty="0" smtClean="0"/>
+              <a:t> </a:t>
+            </a:r>
+            <a:r>
+              <a:rPr lang="en-US" dirty="0" err="1" smtClean="0"/>
+              <a:t>insetos</a:t>
+            </a:r>
+            <a:r>
+              <a:rPr lang="en-US" dirty="0" smtClean="0"/>
+              <a:t> e </a:t>
+            </a:r>
+            <a:r>
+              <a:rPr lang="en-US" dirty="0" err="1" smtClean="0"/>
+              <a:t>pragas</a:t>
+            </a:r>
+            <a:r>
+              <a:rPr lang="en-US" dirty="0" smtClean="0"/>
+              <a:t> do </a:t>
+            </a:r>
+            <a:r>
+              <a:rPr lang="en-US" dirty="0" err="1" smtClean="0"/>
+              <a:t>milho</a:t>
+            </a:r>
+            <a:r>
+              <a:rPr lang="en-US" dirty="0" smtClean="0"/>
+              <a:t>.</a:t>
+            </a:r>
+          </a:p>
+          <a:p>
+            <a:r>
+              <a:rPr lang="en-US" dirty="0" smtClean="0"/>
+              <a:t>Boss e </a:t>
+            </a:r>
+            <a:r>
+              <a:rPr lang="en-US" dirty="0" err="1" smtClean="0"/>
+              <a:t>termina</a:t>
+            </a:r>
+            <a:r>
+              <a:rPr lang="en-US" dirty="0" smtClean="0"/>
+              <a:t> com a </a:t>
+            </a:r>
+            <a:r>
+              <a:rPr lang="en-US" dirty="0" err="1" smtClean="0"/>
+              <a:t>destruição</a:t>
+            </a:r>
+            <a:r>
+              <a:rPr lang="en-US" dirty="0" smtClean="0"/>
+              <a:t> do lab.</a:t>
+            </a:r>
+          </a:p>
+          <a:p>
+            <a:endParaRPr lang="pt-BR" dirty="0"/>
+          </a:p>
+        </p:txBody>
+      </p:sp>
+    </p:spTree>
+    <p:extLst>
+      <p:ext uri="{BB962C8B-B14F-4D97-AF65-F5344CB8AC3E}">
+        <p14:creationId xmlns:p14="http://schemas.microsoft.com/office/powerpoint/2010/main" val="1698269805"/>
+      </p:ext>
+    </p:extLst>
+  </p:cSld>
+  <p:clrMapOvr>
+    <a:masterClrMapping/>
+  </p:clrMapOvr>
+</p:sld>
+</file>
+
 <file path=ppt/theme/theme1.xml><?xml version="1.0" encoding="utf-8"?>
 <a:theme xmlns:a="http://schemas.openxmlformats.org/drawingml/2006/main" name="Tema do Office">
   <a:themeElements>

</xml_diff>

<commit_message>
Save/ load game improved for more than 1 level / level 2 design initiated
</commit_message>
<xml_diff>
--- a/Project Data/Ciclo de trabalho.pptx
+++ b/Project Data/Ciclo de trabalho.pptx
@@ -3417,7 +3417,7 @@
           <a:p>
             <a:fld id="{033C220F-AFE8-4CCC-95E1-E0424241E150}" type="datetimeFigureOut">
               <a:rPr lang="pt-BR" smtClean="0"/>
-              <a:t>15/02/2018</a:t>
+              <a:t>19/02/2018</a:t>
             </a:fld>
             <a:endParaRPr lang="pt-BR"/>
           </a:p>
@@ -3587,7 +3587,7 @@
           <a:p>
             <a:fld id="{033C220F-AFE8-4CCC-95E1-E0424241E150}" type="datetimeFigureOut">
               <a:rPr lang="pt-BR" smtClean="0"/>
-              <a:t>15/02/2018</a:t>
+              <a:t>19/02/2018</a:t>
             </a:fld>
             <a:endParaRPr lang="pt-BR"/>
           </a:p>
@@ -3767,7 +3767,7 @@
           <a:p>
             <a:fld id="{033C220F-AFE8-4CCC-95E1-E0424241E150}" type="datetimeFigureOut">
               <a:rPr lang="pt-BR" smtClean="0"/>
-              <a:t>15/02/2018</a:t>
+              <a:t>19/02/2018</a:t>
             </a:fld>
             <a:endParaRPr lang="pt-BR"/>
           </a:p>
@@ -3937,7 +3937,7 @@
           <a:p>
             <a:fld id="{033C220F-AFE8-4CCC-95E1-E0424241E150}" type="datetimeFigureOut">
               <a:rPr lang="pt-BR" smtClean="0"/>
-              <a:t>15/02/2018</a:t>
+              <a:t>19/02/2018</a:t>
             </a:fld>
             <a:endParaRPr lang="pt-BR"/>
           </a:p>
@@ -4183,7 +4183,7 @@
           <a:p>
             <a:fld id="{033C220F-AFE8-4CCC-95E1-E0424241E150}" type="datetimeFigureOut">
               <a:rPr lang="pt-BR" smtClean="0"/>
-              <a:t>15/02/2018</a:t>
+              <a:t>19/02/2018</a:t>
             </a:fld>
             <a:endParaRPr lang="pt-BR"/>
           </a:p>
@@ -4415,7 +4415,7 @@
           <a:p>
             <a:fld id="{033C220F-AFE8-4CCC-95E1-E0424241E150}" type="datetimeFigureOut">
               <a:rPr lang="pt-BR" smtClean="0"/>
-              <a:t>15/02/2018</a:t>
+              <a:t>19/02/2018</a:t>
             </a:fld>
             <a:endParaRPr lang="pt-BR"/>
           </a:p>
@@ -4782,7 +4782,7 @@
           <a:p>
             <a:fld id="{033C220F-AFE8-4CCC-95E1-E0424241E150}" type="datetimeFigureOut">
               <a:rPr lang="pt-BR" smtClean="0"/>
-              <a:t>15/02/2018</a:t>
+              <a:t>19/02/2018</a:t>
             </a:fld>
             <a:endParaRPr lang="pt-BR"/>
           </a:p>
@@ -4900,7 +4900,7 @@
           <a:p>
             <a:fld id="{033C220F-AFE8-4CCC-95E1-E0424241E150}" type="datetimeFigureOut">
               <a:rPr lang="pt-BR" smtClean="0"/>
-              <a:t>15/02/2018</a:t>
+              <a:t>19/02/2018</a:t>
             </a:fld>
             <a:endParaRPr lang="pt-BR"/>
           </a:p>
@@ -4995,7 +4995,7 @@
           <a:p>
             <a:fld id="{033C220F-AFE8-4CCC-95E1-E0424241E150}" type="datetimeFigureOut">
               <a:rPr lang="pt-BR" smtClean="0"/>
-              <a:t>15/02/2018</a:t>
+              <a:t>19/02/2018</a:t>
             </a:fld>
             <a:endParaRPr lang="pt-BR"/>
           </a:p>
@@ -5272,7 +5272,7 @@
           <a:p>
             <a:fld id="{033C220F-AFE8-4CCC-95E1-E0424241E150}" type="datetimeFigureOut">
               <a:rPr lang="pt-BR" smtClean="0"/>
-              <a:t>15/02/2018</a:t>
+              <a:t>19/02/2018</a:t>
             </a:fld>
             <a:endParaRPr lang="pt-BR"/>
           </a:p>
@@ -5525,7 +5525,7 @@
           <a:p>
             <a:fld id="{033C220F-AFE8-4CCC-95E1-E0424241E150}" type="datetimeFigureOut">
               <a:rPr lang="pt-BR" smtClean="0"/>
-              <a:t>15/02/2018</a:t>
+              <a:t>19/02/2018</a:t>
             </a:fld>
             <a:endParaRPr lang="pt-BR"/>
           </a:p>
@@ -5738,7 +5738,7 @@
           <a:p>
             <a:fld id="{033C220F-AFE8-4CCC-95E1-E0424241E150}" type="datetimeFigureOut">
               <a:rPr lang="pt-BR" smtClean="0"/>
-              <a:t>15/02/2018</a:t>
+              <a:t>19/02/2018</a:t>
             </a:fld>
             <a:endParaRPr lang="pt-BR"/>
           </a:p>
@@ -7224,7 +7224,15 @@
           <a:p>
             <a:r>
               <a:rPr lang="pt-BR" dirty="0" smtClean="0"/>
-              <a:t>	- Aumentar o nível 1 e Concluir </a:t>
+              <a:t>	- </a:t>
+            </a:r>
+            <a:r>
+              <a:rPr lang="pt-BR" strike="sngStrike" dirty="0" smtClean="0"/>
+              <a:t>Aumentar o nível 1 </a:t>
+            </a:r>
+            <a:r>
+              <a:rPr lang="pt-BR" dirty="0" smtClean="0"/>
+              <a:t>e Concluir </a:t>
             </a:r>
             <a:r>
               <a:rPr lang="pt-BR" dirty="0" err="1" smtClean="0"/>
@@ -7264,12 +7272,8 @@
               <a:t>	</a:t>
             </a:r>
             <a:r>
-              <a:rPr lang="pt-BR" dirty="0" smtClean="0"/>
-              <a:t>- Melhorar a Bomba </a:t>
-            </a:r>
-            <a:r>
               <a:rPr lang="pt-BR" strike="sngStrike" dirty="0" smtClean="0"/>
-              <a:t>(e o seu UI)</a:t>
+              <a:t>- Melhorar a Bomba (e o seu UI)</a:t>
             </a:r>
           </a:p>
           <a:p>
@@ -7278,15 +7282,15 @@
               <a:t>	</a:t>
             </a:r>
             <a:r>
-              <a:rPr lang="pt-BR" dirty="0" smtClean="0"/>
+              <a:rPr lang="pt-BR" strike="sngStrike" dirty="0" smtClean="0"/>
               <a:t>- Fazer parede </a:t>
             </a:r>
             <a:r>
-              <a:rPr lang="pt-BR" dirty="0" err="1" smtClean="0"/>
+              <a:rPr lang="pt-BR" strike="sngStrike" dirty="0" err="1" smtClean="0"/>
               <a:t>quebravel</a:t>
             </a:r>
             <a:r>
-              <a:rPr lang="pt-BR" dirty="0" smtClean="0"/>
+              <a:rPr lang="pt-BR" strike="sngStrike" dirty="0" smtClean="0"/>
               <a:t> </a:t>
             </a:r>
           </a:p>
@@ -7306,15 +7310,15 @@
               <a:t>	</a:t>
             </a:r>
             <a:r>
-              <a:rPr lang="pt-BR" dirty="0" smtClean="0"/>
+              <a:rPr lang="pt-BR" strike="sngStrike" dirty="0" smtClean="0"/>
               <a:t>- Mais detalhe no background(rafa fez nuvens) do </a:t>
             </a:r>
             <a:r>
-              <a:rPr lang="pt-BR" dirty="0" err="1" smtClean="0"/>
+              <a:rPr lang="pt-BR" strike="sngStrike" dirty="0" err="1" smtClean="0"/>
               <a:t>main</a:t>
             </a:r>
             <a:r>
-              <a:rPr lang="pt-BR" dirty="0" smtClean="0"/>
+              <a:rPr lang="pt-BR" strike="sngStrike" dirty="0" smtClean="0"/>
               <a:t> menu(rafa fazendo mapa da fazenda)</a:t>
             </a:r>
           </a:p>

</xml_diff>